<commit_message>
day: 3 . research has been completed.
</commit_message>
<xml_diff>
--- a/Homework(research).pptx
+++ b/Homework(research).pptx
@@ -344,7 +344,7 @@
           <a:p>
             <a:fld id="{7453AEDE-A44B-4453-AA99-6868FFC77830}" type="datetimeFigureOut">
               <a:rPr lang="tr-TR" smtClean="0"/>
-              <a:t>25.05.2022</a:t>
+              <a:t>28.05.2022</a:t>
             </a:fld>
             <a:endParaRPr lang="tr-TR"/>
           </a:p>
@@ -552,7 +552,7 @@
           <a:p>
             <a:fld id="{7453AEDE-A44B-4453-AA99-6868FFC77830}" type="datetimeFigureOut">
               <a:rPr lang="tr-TR" smtClean="0"/>
-              <a:t>25.05.2022</a:t>
+              <a:t>28.05.2022</a:t>
             </a:fld>
             <a:endParaRPr lang="tr-TR"/>
           </a:p>
@@ -808,7 +808,7 @@
           <a:p>
             <a:fld id="{7453AEDE-A44B-4453-AA99-6868FFC77830}" type="datetimeFigureOut">
               <a:rPr lang="tr-TR" smtClean="0"/>
-              <a:t>25.05.2022</a:t>
+              <a:t>28.05.2022</a:t>
             </a:fld>
             <a:endParaRPr lang="tr-TR"/>
           </a:p>
@@ -982,7 +982,7 @@
           <a:p>
             <a:fld id="{7453AEDE-A44B-4453-AA99-6868FFC77830}" type="datetimeFigureOut">
               <a:rPr lang="tr-TR" smtClean="0"/>
-              <a:t>25.05.2022</a:t>
+              <a:t>28.05.2022</a:t>
             </a:fld>
             <a:endParaRPr lang="tr-TR"/>
           </a:p>
@@ -1325,7 +1325,7 @@
           <a:p>
             <a:fld id="{7453AEDE-A44B-4453-AA99-6868FFC77830}" type="datetimeFigureOut">
               <a:rPr lang="tr-TR" smtClean="0"/>
-              <a:t>25.05.2022</a:t>
+              <a:t>28.05.2022</a:t>
             </a:fld>
             <a:endParaRPr lang="tr-TR"/>
           </a:p>
@@ -1600,7 +1600,7 @@
           <a:p>
             <a:fld id="{7453AEDE-A44B-4453-AA99-6868FFC77830}" type="datetimeFigureOut">
               <a:rPr lang="tr-TR" smtClean="0"/>
-              <a:t>25.05.2022</a:t>
+              <a:t>28.05.2022</a:t>
             </a:fld>
             <a:endParaRPr lang="tr-TR"/>
           </a:p>
@@ -1979,7 +1979,7 @@
           <a:p>
             <a:fld id="{7453AEDE-A44B-4453-AA99-6868FFC77830}" type="datetimeFigureOut">
               <a:rPr lang="tr-TR" smtClean="0"/>
-              <a:t>25.05.2022</a:t>
+              <a:t>28.05.2022</a:t>
             </a:fld>
             <a:endParaRPr lang="tr-TR"/>
           </a:p>
@@ -2097,7 +2097,7 @@
           <a:p>
             <a:fld id="{7453AEDE-A44B-4453-AA99-6868FFC77830}" type="datetimeFigureOut">
               <a:rPr lang="tr-TR" smtClean="0"/>
-              <a:t>25.05.2022</a:t>
+              <a:t>28.05.2022</a:t>
             </a:fld>
             <a:endParaRPr lang="tr-TR"/>
           </a:p>
@@ -2268,7 +2268,7 @@
           <a:p>
             <a:fld id="{7453AEDE-A44B-4453-AA99-6868FFC77830}" type="datetimeFigureOut">
               <a:rPr lang="tr-TR" smtClean="0"/>
-              <a:t>25.05.2022</a:t>
+              <a:t>28.05.2022</a:t>
             </a:fld>
             <a:endParaRPr lang="tr-TR"/>
           </a:p>
@@ -2622,7 +2622,7 @@
           <a:p>
             <a:fld id="{7453AEDE-A44B-4453-AA99-6868FFC77830}" type="datetimeFigureOut">
               <a:rPr lang="tr-TR" smtClean="0"/>
-              <a:t>25.05.2022</a:t>
+              <a:t>28.05.2022</a:t>
             </a:fld>
             <a:endParaRPr lang="tr-TR"/>
           </a:p>
@@ -3004,7 +3004,7 @@
           <a:p>
             <a:fld id="{7453AEDE-A44B-4453-AA99-6868FFC77830}" type="datetimeFigureOut">
               <a:rPr lang="tr-TR" smtClean="0"/>
-              <a:t>25.05.2022</a:t>
+              <a:t>28.05.2022</a:t>
             </a:fld>
             <a:endParaRPr lang="tr-TR"/>
           </a:p>
@@ -3291,7 +3291,7 @@
           <a:p>
             <a:fld id="{7453AEDE-A44B-4453-AA99-6868FFC77830}" type="datetimeFigureOut">
               <a:rPr lang="tr-TR" smtClean="0"/>
-              <a:t>25.05.2022</a:t>
+              <a:t>28.05.2022</a:t>
             </a:fld>
             <a:endParaRPr lang="tr-TR"/>
           </a:p>
@@ -5419,7 +5419,7 @@
         <p:spPr>
           <a:xfrm>
             <a:off x="4341181" y="257452"/>
-            <a:ext cx="7492753" cy="646331"/>
+            <a:ext cx="7492753" cy="1200329"/>
           </a:xfrm>
           <a:prstGeom prst="rect">
             <a:avLst/>
@@ -5433,11 +5433,11 @@
           <a:lstStyle/>
           <a:p>
             <a:r>
-              <a:rPr lang="tr-TR" dirty="0" err="1"/>
-              <a:t>İntegrity</a:t>
-            </a:r>
-            <a:r>
-              <a:rPr lang="tr-TR" dirty="0"/>
+              <a:rPr lang="tr-TR" b="1" u="sng" dirty="0" err="1"/>
+              <a:t>Integrity</a:t>
+            </a:r>
+            <a:r>
+              <a:rPr lang="tr-TR" b="1" u="sng" dirty="0"/>
               <a:t>: </a:t>
             </a:r>
             <a:r>
@@ -5446,7 +5446,7 @@
             </a:r>
             <a:r>
               <a:rPr lang="tr-TR" dirty="0"/>
-              <a:t> ile çektiğimiz verilerin güvenliğini sağlayan bir yapı diyebiliriz. Bu yapı kötü amaçlı </a:t>
+              <a:t> ile çektiğimiz verilerin güvenliğini sağlayan bir sistem diyebiliriz. Çekilen kaynak kodları manipüle edilmiş ve değiştirilmiş ise bu kodların çekilmediğinden emin olan yapıdır. Bu yapı kötü amaçlı </a:t>
             </a:r>
             <a:r>
               <a:rPr lang="tr-TR" dirty="0" err="1"/>
@@ -5456,6 +5456,216 @@
               <a:rPr lang="tr-TR" dirty="0"/>
               <a:t> kendimi korumamız için geliştirilmiş bir yapıdır.</a:t>
             </a:r>
+          </a:p>
+        </p:txBody>
+      </p:sp>
+      <p:sp>
+        <p:nvSpPr>
+          <p:cNvPr id="9" name="Metin kutusu 8">
+            <a:extLst>
+              <a:ext uri="{FF2B5EF4-FFF2-40B4-BE49-F238E27FC236}">
+                <a16:creationId xmlns:a16="http://schemas.microsoft.com/office/drawing/2014/main" id="{70BBB15C-592E-C171-4251-0F599C54C82C}"/>
+              </a:ext>
+            </a:extLst>
+          </p:cNvPr>
+          <p:cNvSpPr txBox="1"/>
+          <p:nvPr/>
+        </p:nvSpPr>
+        <p:spPr>
+          <a:xfrm>
+            <a:off x="4341180" y="1715233"/>
+            <a:ext cx="7492753" cy="1200329"/>
+          </a:xfrm>
+          <a:prstGeom prst="rect">
+            <a:avLst/>
+          </a:prstGeom>
+          <a:noFill/>
+        </p:spPr>
+        <p:txBody>
+          <a:bodyPr wrap="square" rtlCol="0">
+            <a:spAutoFit/>
+          </a:bodyPr>
+          <a:lstStyle/>
+          <a:p>
+            <a:r>
+              <a:rPr lang="tr-TR" b="1" u="sng" dirty="0" err="1"/>
+              <a:t>Croosorigin</a:t>
+            </a:r>
+            <a:r>
+              <a:rPr lang="tr-TR" b="1" u="sng" dirty="0"/>
+              <a:t>(CORS):</a:t>
+            </a:r>
+            <a:r>
+              <a:rPr lang="tr-TR" dirty="0"/>
+              <a:t> Bağlantılar (kökler) arası isteklerin yönlendirmesini yapan sistemdir. Aynı zamanda bağlantının güvenli olup olmadığına karar vermek için kullanılır. Ancak genel olarak kullanım amacı içeriğin korumak ve sunucu kaynaklarını daha efektif uygulanmasıdır. </a:t>
+            </a:r>
+          </a:p>
+        </p:txBody>
+      </p:sp>
+      <p:sp>
+        <p:nvSpPr>
+          <p:cNvPr id="11" name="Metin kutusu 10">
+            <a:extLst>
+              <a:ext uri="{FF2B5EF4-FFF2-40B4-BE49-F238E27FC236}">
+                <a16:creationId xmlns:a16="http://schemas.microsoft.com/office/drawing/2014/main" id="{49C9A613-7679-496E-3FB8-BC015A4CFFCD}"/>
+              </a:ext>
+            </a:extLst>
+          </p:cNvPr>
+          <p:cNvSpPr txBox="1"/>
+          <p:nvPr/>
+        </p:nvSpPr>
+        <p:spPr>
+          <a:xfrm>
+            <a:off x="4341179" y="3173014"/>
+            <a:ext cx="7492753" cy="1200329"/>
+          </a:xfrm>
+          <a:prstGeom prst="rect">
+            <a:avLst/>
+          </a:prstGeom>
+          <a:noFill/>
+        </p:spPr>
+        <p:txBody>
+          <a:bodyPr wrap="square" rtlCol="0">
+            <a:spAutoFit/>
+          </a:bodyPr>
+          <a:lstStyle/>
+          <a:p>
+            <a:r>
+              <a:rPr lang="tr-TR" b="1" u="sng" dirty="0" err="1"/>
+              <a:t>Same</a:t>
+            </a:r>
+            <a:r>
+              <a:rPr lang="tr-TR" b="1" u="sng" dirty="0"/>
+              <a:t> </a:t>
+            </a:r>
+            <a:r>
+              <a:rPr lang="tr-TR" b="1" u="sng" dirty="0" err="1"/>
+              <a:t>Origin</a:t>
+            </a:r>
+            <a:r>
+              <a:rPr lang="tr-TR" b="1" u="sng" dirty="0"/>
+              <a:t> </a:t>
+            </a:r>
+            <a:r>
+              <a:rPr lang="tr-TR" b="1" u="sng" dirty="0" err="1"/>
+              <a:t>Policy</a:t>
+            </a:r>
+            <a:r>
+              <a:rPr lang="tr-TR" b="1" u="sng" dirty="0"/>
+              <a:t>(SOP): </a:t>
+            </a:r>
+            <a:r>
+              <a:rPr lang="tr-TR" dirty="0"/>
+              <a:t>CORS ile beraber kullanılan bu yapı, DOM nesnelerini orijinal sayfa içerisinde sınırlama, hangi kaynaklarda çalışacağını izin verme gibi konularda önemli bir yer almaktadır. Sınırlarken kullanılanlar ise protokol, URL ve port bileşimidir. </a:t>
+            </a:r>
+          </a:p>
+        </p:txBody>
+      </p:sp>
+      <p:sp>
+        <p:nvSpPr>
+          <p:cNvPr id="13" name="Metin kutusu 12">
+            <a:extLst>
+              <a:ext uri="{FF2B5EF4-FFF2-40B4-BE49-F238E27FC236}">
+                <a16:creationId xmlns:a16="http://schemas.microsoft.com/office/drawing/2014/main" id="{15C19CF7-C238-EF7E-8B62-B6E8A712AC04}"/>
+              </a:ext>
+            </a:extLst>
+          </p:cNvPr>
+          <p:cNvSpPr txBox="1"/>
+          <p:nvPr/>
+        </p:nvSpPr>
+        <p:spPr>
+          <a:xfrm>
+            <a:off x="4341178" y="4630795"/>
+            <a:ext cx="7492753" cy="1754326"/>
+          </a:xfrm>
+          <a:prstGeom prst="rect">
+            <a:avLst/>
+          </a:prstGeom>
+          <a:noFill/>
+        </p:spPr>
+        <p:txBody>
+          <a:bodyPr wrap="square" rtlCol="0">
+            <a:spAutoFit/>
+          </a:bodyPr>
+          <a:lstStyle/>
+          <a:p>
+            <a:r>
+              <a:rPr lang="tr-TR" b="1" u="sng" dirty="0" err="1"/>
+              <a:t>Scrollspy</a:t>
+            </a:r>
+            <a:r>
+              <a:rPr lang="tr-TR" b="1" u="sng" dirty="0"/>
+              <a:t>: </a:t>
+            </a:r>
+            <a:r>
+              <a:rPr lang="tr-TR" dirty="0"/>
+              <a:t> </a:t>
+            </a:r>
+            <a:r>
+              <a:rPr lang="tr-TR" dirty="0" err="1"/>
+              <a:t>Bootstrap</a:t>
+            </a:r>
+            <a:r>
+              <a:rPr lang="tr-TR" dirty="0"/>
+              <a:t> </a:t>
+            </a:r>
+            <a:r>
+              <a:rPr lang="tr-TR" dirty="0" err="1"/>
+              <a:t>componenti</a:t>
+            </a:r>
+            <a:r>
+              <a:rPr lang="tr-TR" dirty="0"/>
+              <a:t> olan bu yapı sitemiz içerisinde olan bölümleri aslında izliyor. ‘</a:t>
+            </a:r>
+            <a:r>
+              <a:rPr lang="tr-TR" dirty="0" err="1"/>
+              <a:t>Scroll</a:t>
+            </a:r>
+            <a:r>
+              <a:rPr lang="tr-TR" dirty="0"/>
+              <a:t>’ kaydırma ‘</a:t>
+            </a:r>
+            <a:r>
+              <a:rPr lang="tr-TR" dirty="0" err="1"/>
+              <a:t>spy</a:t>
+            </a:r>
+            <a:r>
+              <a:rPr lang="tr-TR" dirty="0"/>
+              <a:t> ‘ ise casus anlamına gelmektedir. Kelime anlamından anlaşılacağı üzere, site üzerinde hangi bölümde olduğumuzu istediğimiz yapıya iletmektedir. Örneğin bir </a:t>
+            </a:r>
+            <a:r>
+              <a:rPr lang="tr-TR" dirty="0" err="1"/>
+              <a:t>navbarımız</a:t>
+            </a:r>
+            <a:r>
+              <a:rPr lang="tr-TR" dirty="0"/>
+              <a:t> olsun ve o </a:t>
+            </a:r>
+            <a:r>
+              <a:rPr lang="tr-TR" dirty="0" err="1"/>
+              <a:t>navbar</a:t>
+            </a:r>
+            <a:r>
+              <a:rPr lang="tr-TR" dirty="0"/>
+              <a:t> içerisinde bölümlerimiz olsun. Hangi bölümde olduğumuzu </a:t>
+            </a:r>
+            <a:r>
+              <a:rPr lang="tr-TR" dirty="0" err="1"/>
+              <a:t>scrollspy</a:t>
+            </a:r>
+            <a:r>
+              <a:rPr lang="tr-TR" dirty="0"/>
+              <a:t> sayesinde </a:t>
+            </a:r>
+            <a:r>
+              <a:rPr lang="tr-TR" dirty="0" err="1"/>
+              <a:t>navbara</a:t>
+            </a:r>
+            <a:r>
+              <a:rPr lang="tr-TR"/>
+              <a:t> iletebiliriz. </a:t>
+            </a:r>
+            <a:endParaRPr lang="tr-TR" dirty="0"/>
           </a:p>
         </p:txBody>
       </p:sp>

</xml_diff>

<commit_message>
text-reset, ASCII vs UNICODE, background cs background-color, sweet aler
</commit_message>
<xml_diff>
--- a/Homework(research).pptx
+++ b/Homework(research).pptx
@@ -12,6 +12,10 @@
     <p:sldId id="260" r:id="rId6"/>
     <p:sldId id="261" r:id="rId7"/>
     <p:sldId id="262" r:id="rId8"/>
+    <p:sldId id="263" r:id="rId9"/>
+    <p:sldId id="264" r:id="rId10"/>
+    <p:sldId id="265" r:id="rId11"/>
+    <p:sldId id="266" r:id="rId12"/>
   </p:sldIdLst>
   <p:sldSz cx="12192000" cy="6858000"/>
   <p:notesSz cx="6858000" cy="9144000"/>
@@ -344,7 +348,7 @@
           <a:p>
             <a:fld id="{7453AEDE-A44B-4453-AA99-6868FFC77830}" type="datetimeFigureOut">
               <a:rPr lang="tr-TR" smtClean="0"/>
-              <a:t>28.05.2022</a:t>
+              <a:t>31.05.2022</a:t>
             </a:fld>
             <a:endParaRPr lang="tr-TR"/>
           </a:p>
@@ -552,7 +556,7 @@
           <a:p>
             <a:fld id="{7453AEDE-A44B-4453-AA99-6868FFC77830}" type="datetimeFigureOut">
               <a:rPr lang="tr-TR" smtClean="0"/>
-              <a:t>28.05.2022</a:t>
+              <a:t>31.05.2022</a:t>
             </a:fld>
             <a:endParaRPr lang="tr-TR"/>
           </a:p>
@@ -808,7 +812,7 @@
           <a:p>
             <a:fld id="{7453AEDE-A44B-4453-AA99-6868FFC77830}" type="datetimeFigureOut">
               <a:rPr lang="tr-TR" smtClean="0"/>
-              <a:t>28.05.2022</a:t>
+              <a:t>31.05.2022</a:t>
             </a:fld>
             <a:endParaRPr lang="tr-TR"/>
           </a:p>
@@ -982,7 +986,7 @@
           <a:p>
             <a:fld id="{7453AEDE-A44B-4453-AA99-6868FFC77830}" type="datetimeFigureOut">
               <a:rPr lang="tr-TR" smtClean="0"/>
-              <a:t>28.05.2022</a:t>
+              <a:t>31.05.2022</a:t>
             </a:fld>
             <a:endParaRPr lang="tr-TR"/>
           </a:p>
@@ -1325,7 +1329,7 @@
           <a:p>
             <a:fld id="{7453AEDE-A44B-4453-AA99-6868FFC77830}" type="datetimeFigureOut">
               <a:rPr lang="tr-TR" smtClean="0"/>
-              <a:t>28.05.2022</a:t>
+              <a:t>31.05.2022</a:t>
             </a:fld>
             <a:endParaRPr lang="tr-TR"/>
           </a:p>
@@ -1600,7 +1604,7 @@
           <a:p>
             <a:fld id="{7453AEDE-A44B-4453-AA99-6868FFC77830}" type="datetimeFigureOut">
               <a:rPr lang="tr-TR" smtClean="0"/>
-              <a:t>28.05.2022</a:t>
+              <a:t>31.05.2022</a:t>
             </a:fld>
             <a:endParaRPr lang="tr-TR"/>
           </a:p>
@@ -1979,7 +1983,7 @@
           <a:p>
             <a:fld id="{7453AEDE-A44B-4453-AA99-6868FFC77830}" type="datetimeFigureOut">
               <a:rPr lang="tr-TR" smtClean="0"/>
-              <a:t>28.05.2022</a:t>
+              <a:t>31.05.2022</a:t>
             </a:fld>
             <a:endParaRPr lang="tr-TR"/>
           </a:p>
@@ -2097,7 +2101,7 @@
           <a:p>
             <a:fld id="{7453AEDE-A44B-4453-AA99-6868FFC77830}" type="datetimeFigureOut">
               <a:rPr lang="tr-TR" smtClean="0"/>
-              <a:t>28.05.2022</a:t>
+              <a:t>31.05.2022</a:t>
             </a:fld>
             <a:endParaRPr lang="tr-TR"/>
           </a:p>
@@ -2268,7 +2272,7 @@
           <a:p>
             <a:fld id="{7453AEDE-A44B-4453-AA99-6868FFC77830}" type="datetimeFigureOut">
               <a:rPr lang="tr-TR" smtClean="0"/>
-              <a:t>28.05.2022</a:t>
+              <a:t>31.05.2022</a:t>
             </a:fld>
             <a:endParaRPr lang="tr-TR"/>
           </a:p>
@@ -2622,7 +2626,7 @@
           <a:p>
             <a:fld id="{7453AEDE-A44B-4453-AA99-6868FFC77830}" type="datetimeFigureOut">
               <a:rPr lang="tr-TR" smtClean="0"/>
-              <a:t>28.05.2022</a:t>
+              <a:t>31.05.2022</a:t>
             </a:fld>
             <a:endParaRPr lang="tr-TR"/>
           </a:p>
@@ -3004,7 +3008,7 @@
           <a:p>
             <a:fld id="{7453AEDE-A44B-4453-AA99-6868FFC77830}" type="datetimeFigureOut">
               <a:rPr lang="tr-TR" smtClean="0"/>
-              <a:t>28.05.2022</a:t>
+              <a:t>31.05.2022</a:t>
             </a:fld>
             <a:endParaRPr lang="tr-TR"/>
           </a:p>
@@ -3291,7 +3295,7 @@
           <a:p>
             <a:fld id="{7453AEDE-A44B-4453-AA99-6868FFC77830}" type="datetimeFigureOut">
               <a:rPr lang="tr-TR" smtClean="0"/>
-              <a:t>28.05.2022</a:t>
+              <a:t>31.05.2022</a:t>
             </a:fld>
             <a:endParaRPr lang="tr-TR"/>
           </a:p>
@@ -4179,6 +4183,1027 @@
 </p:sld>
 </file>
 
+<file path=ppt/slides/slide10.xml><?xml version="1.0" encoding="utf-8"?>
+<p:sld xmlns:a="http://schemas.openxmlformats.org/drawingml/2006/main" xmlns:r="http://schemas.openxmlformats.org/officeDocument/2006/relationships" xmlns:p="http://schemas.openxmlformats.org/presentationml/2006/main">
+  <p:cSld>
+    <p:bg>
+      <p:bgPr>
+        <a:solidFill>
+          <a:schemeClr val="bg1"/>
+        </a:solidFill>
+        <a:effectLst/>
+      </p:bgPr>
+    </p:bg>
+    <p:spTree>
+      <p:nvGrpSpPr>
+        <p:cNvPr id="1" name=""/>
+        <p:cNvGrpSpPr/>
+        <p:nvPr/>
+      </p:nvGrpSpPr>
+      <p:grpSpPr>
+        <a:xfrm>
+          <a:off x="0" y="0"/>
+          <a:ext cx="0" cy="0"/>
+          <a:chOff x="0" y="0"/>
+          <a:chExt cx="0" cy="0"/>
+        </a:xfrm>
+      </p:grpSpPr>
+      <p:sp>
+        <p:nvSpPr>
+          <p:cNvPr id="5" name="Başlık 4">
+            <a:extLst>
+              <a:ext uri="{FF2B5EF4-FFF2-40B4-BE49-F238E27FC236}">
+                <a16:creationId xmlns:a16="http://schemas.microsoft.com/office/drawing/2014/main" id="{8E1A63B1-2AEE-1610-F2F9-D348CF2BC159}"/>
+              </a:ext>
+            </a:extLst>
+          </p:cNvPr>
+          <p:cNvSpPr>
+            <a:spLocks noGrp="1"/>
+          </p:cNvSpPr>
+          <p:nvPr>
+            <p:ph type="title"/>
+          </p:nvPr>
+        </p:nvSpPr>
+        <p:spPr>
+          <a:xfrm>
+            <a:off x="1097280" y="286603"/>
+            <a:ext cx="10058400" cy="1450757"/>
+          </a:xfrm>
+        </p:spPr>
+        <p:txBody>
+          <a:bodyPr>
+            <a:normAutofit/>
+          </a:bodyPr>
+          <a:lstStyle/>
+          <a:p>
+            <a:r>
+              <a:rPr lang="tr-TR" dirty="0"/>
+              <a:t>Background </a:t>
+            </a:r>
+            <a:r>
+              <a:rPr lang="tr-TR" dirty="0" err="1"/>
+              <a:t>vs</a:t>
+            </a:r>
+            <a:r>
+              <a:rPr lang="tr-TR" dirty="0"/>
+              <a:t> Background-</a:t>
+            </a:r>
+            <a:r>
+              <a:rPr lang="tr-TR" dirty="0" err="1"/>
+              <a:t>color</a:t>
+            </a:r>
+            <a:endParaRPr lang="tr-TR" dirty="0"/>
+          </a:p>
+        </p:txBody>
+      </p:sp>
+      <p:sp>
+        <p:nvSpPr>
+          <p:cNvPr id="3" name="İçerik Yer Tutucusu 2">
+            <a:extLst>
+              <a:ext uri="{FF2B5EF4-FFF2-40B4-BE49-F238E27FC236}">
+                <a16:creationId xmlns:a16="http://schemas.microsoft.com/office/drawing/2014/main" id="{41C94E64-C23D-DBAB-066E-0B673E9AB65A}"/>
+              </a:ext>
+            </a:extLst>
+          </p:cNvPr>
+          <p:cNvSpPr>
+            <a:spLocks noGrp="1"/>
+          </p:cNvSpPr>
+          <p:nvPr>
+            <p:ph idx="1"/>
+          </p:nvPr>
+        </p:nvSpPr>
+        <p:spPr>
+          <a:xfrm>
+            <a:off x="1097279" y="1845734"/>
+            <a:ext cx="4078403" cy="4023360"/>
+          </a:xfrm>
+        </p:spPr>
+        <p:txBody>
+          <a:bodyPr>
+            <a:normAutofit fontScale="92500" lnSpcReduction="20000"/>
+          </a:bodyPr>
+          <a:lstStyle/>
+          <a:p>
+            <a:r>
+              <a:rPr lang="tr-TR" sz="2400" dirty="0"/>
+              <a:t>Background komutu aşağıda yer alan özelliğin kısa yoludur:</a:t>
+            </a:r>
+          </a:p>
+          <a:p>
+            <a:pPr>
+              <a:buFont typeface="Arial" panose="020B0604020202020204" pitchFamily="34" charset="0"/>
+              <a:buChar char="•"/>
+            </a:pPr>
+            <a:r>
+              <a:rPr lang="tr-TR" sz="2400" dirty="0"/>
+              <a:t> </a:t>
+            </a:r>
+            <a:r>
+              <a:rPr lang="en-US" sz="2400" dirty="0"/>
+              <a:t>background-color</a:t>
+            </a:r>
+          </a:p>
+          <a:p>
+            <a:pPr>
+              <a:buFont typeface="Arial" panose="020B0604020202020204" pitchFamily="34" charset="0"/>
+              <a:buChar char="•"/>
+            </a:pPr>
+            <a:r>
+              <a:rPr lang="tr-TR" sz="2400" dirty="0"/>
+              <a:t> </a:t>
+            </a:r>
+            <a:r>
+              <a:rPr lang="en-US" sz="2400" dirty="0"/>
+              <a:t>background-image</a:t>
+            </a:r>
+          </a:p>
+          <a:p>
+            <a:pPr>
+              <a:buFont typeface="Arial" panose="020B0604020202020204" pitchFamily="34" charset="0"/>
+              <a:buChar char="•"/>
+            </a:pPr>
+            <a:r>
+              <a:rPr lang="tr-TR" sz="2400" dirty="0"/>
+              <a:t> </a:t>
+            </a:r>
+            <a:r>
+              <a:rPr lang="en-US" sz="2400" dirty="0"/>
+              <a:t>background-position</a:t>
+            </a:r>
+          </a:p>
+          <a:p>
+            <a:pPr>
+              <a:buFont typeface="Arial" panose="020B0604020202020204" pitchFamily="34" charset="0"/>
+              <a:buChar char="•"/>
+            </a:pPr>
+            <a:r>
+              <a:rPr lang="tr-TR" sz="2400" dirty="0"/>
+              <a:t> </a:t>
+            </a:r>
+            <a:r>
+              <a:rPr lang="en-US" sz="2400" dirty="0"/>
+              <a:t>background-size</a:t>
+            </a:r>
+          </a:p>
+          <a:p>
+            <a:pPr>
+              <a:buFont typeface="Arial" panose="020B0604020202020204" pitchFamily="34" charset="0"/>
+              <a:buChar char="•"/>
+            </a:pPr>
+            <a:r>
+              <a:rPr lang="tr-TR" sz="2400" dirty="0"/>
+              <a:t> </a:t>
+            </a:r>
+            <a:r>
+              <a:rPr lang="en-US" sz="2400" dirty="0"/>
+              <a:t>background-repeat</a:t>
+            </a:r>
+          </a:p>
+          <a:p>
+            <a:pPr>
+              <a:buFont typeface="Arial" panose="020B0604020202020204" pitchFamily="34" charset="0"/>
+              <a:buChar char="•"/>
+            </a:pPr>
+            <a:r>
+              <a:rPr lang="tr-TR" sz="2400" dirty="0"/>
+              <a:t> </a:t>
+            </a:r>
+            <a:r>
+              <a:rPr lang="en-US" sz="2400" dirty="0"/>
+              <a:t>background-origin</a:t>
+            </a:r>
+          </a:p>
+          <a:p>
+            <a:pPr>
+              <a:buFont typeface="Arial" panose="020B0604020202020204" pitchFamily="34" charset="0"/>
+              <a:buChar char="•"/>
+            </a:pPr>
+            <a:r>
+              <a:rPr lang="tr-TR" sz="2400" dirty="0"/>
+              <a:t> </a:t>
+            </a:r>
+            <a:r>
+              <a:rPr lang="en-US" sz="2400" dirty="0"/>
+              <a:t>background-clip</a:t>
+            </a:r>
+          </a:p>
+          <a:p>
+            <a:pPr>
+              <a:buFont typeface="Arial" panose="020B0604020202020204" pitchFamily="34" charset="0"/>
+              <a:buChar char="•"/>
+            </a:pPr>
+            <a:r>
+              <a:rPr lang="tr-TR" sz="2400" dirty="0"/>
+              <a:t> </a:t>
+            </a:r>
+            <a:r>
+              <a:rPr lang="en-US" sz="2400" dirty="0"/>
+              <a:t>background-attachment</a:t>
+            </a:r>
+            <a:endParaRPr lang="tr-TR" sz="2400" dirty="0"/>
+          </a:p>
+          <a:p>
+            <a:pPr>
+              <a:buFont typeface="Arial" panose="020B0604020202020204" pitchFamily="34" charset="0"/>
+              <a:buChar char="•"/>
+            </a:pPr>
+            <a:endParaRPr lang="tr-TR" sz="1700" dirty="0"/>
+          </a:p>
+        </p:txBody>
+      </p:sp>
+      <p:sp>
+        <p:nvSpPr>
+          <p:cNvPr id="4" name="İçerik Yer Tutucusu 2">
+            <a:extLst>
+              <a:ext uri="{FF2B5EF4-FFF2-40B4-BE49-F238E27FC236}">
+                <a16:creationId xmlns:a16="http://schemas.microsoft.com/office/drawing/2014/main" id="{9A010DE7-FDF1-FD4B-8A79-ABB33BFC4B62}"/>
+              </a:ext>
+            </a:extLst>
+          </p:cNvPr>
+          <p:cNvSpPr txBox="1">
+            <a:spLocks/>
+          </p:cNvSpPr>
+          <p:nvPr/>
+        </p:nvSpPr>
+        <p:spPr>
+          <a:xfrm>
+            <a:off x="5175682" y="1845734"/>
+            <a:ext cx="6569475" cy="4023360"/>
+          </a:xfrm>
+          <a:prstGeom prst="rect">
+            <a:avLst/>
+          </a:prstGeom>
+        </p:spPr>
+        <p:txBody>
+          <a:bodyPr vert="horz" lIns="0" tIns="45720" rIns="0" bIns="45720" rtlCol="0">
+            <a:normAutofit/>
+          </a:bodyPr>
+          <a:lstStyle>
+            <a:lvl1pPr marL="91440" indent="-91440" algn="l" defTabSz="914400" rtl="0" eaLnBrk="1" latinLnBrk="0" hangingPunct="1">
+              <a:lnSpc>
+                <a:spcPct val="90000"/>
+              </a:lnSpc>
+              <a:spcBef>
+                <a:spcPts val="1200"/>
+              </a:spcBef>
+              <a:spcAft>
+                <a:spcPts val="200"/>
+              </a:spcAft>
+              <a:buClr>
+                <a:schemeClr val="accent1"/>
+              </a:buClr>
+              <a:buSzPct val="100000"/>
+              <a:buFont typeface="Calibri" panose="020F0502020204030204" pitchFamily="34" charset="0"/>
+              <a:buChar char=" "/>
+              <a:defRPr sz="2000" kern="1200">
+                <a:solidFill>
+                  <a:schemeClr val="tx1">
+                    <a:lumMod val="75000"/>
+                    <a:lumOff val="25000"/>
+                  </a:schemeClr>
+                </a:solidFill>
+                <a:latin typeface="+mn-lt"/>
+                <a:ea typeface="+mn-ea"/>
+                <a:cs typeface="+mn-cs"/>
+              </a:defRPr>
+            </a:lvl1pPr>
+            <a:lvl2pPr marL="384048" indent="-182880" algn="l" defTabSz="914400" rtl="0" eaLnBrk="1" latinLnBrk="0" hangingPunct="1">
+              <a:lnSpc>
+                <a:spcPct val="90000"/>
+              </a:lnSpc>
+              <a:spcBef>
+                <a:spcPts val="200"/>
+              </a:spcBef>
+              <a:spcAft>
+                <a:spcPts val="400"/>
+              </a:spcAft>
+              <a:buClr>
+                <a:schemeClr val="accent1"/>
+              </a:buClr>
+              <a:buFont typeface="Calibri" pitchFamily="34" charset="0"/>
+              <a:buChar char="◦"/>
+              <a:defRPr sz="1800" kern="1200">
+                <a:solidFill>
+                  <a:schemeClr val="tx1">
+                    <a:lumMod val="75000"/>
+                    <a:lumOff val="25000"/>
+                  </a:schemeClr>
+                </a:solidFill>
+                <a:latin typeface="+mn-lt"/>
+                <a:ea typeface="+mn-ea"/>
+                <a:cs typeface="+mn-cs"/>
+              </a:defRPr>
+            </a:lvl2pPr>
+            <a:lvl3pPr marL="566928" indent="-182880" algn="l" defTabSz="914400" rtl="0" eaLnBrk="1" latinLnBrk="0" hangingPunct="1">
+              <a:lnSpc>
+                <a:spcPct val="90000"/>
+              </a:lnSpc>
+              <a:spcBef>
+                <a:spcPts val="200"/>
+              </a:spcBef>
+              <a:spcAft>
+                <a:spcPts val="400"/>
+              </a:spcAft>
+              <a:buClr>
+                <a:schemeClr val="accent1"/>
+              </a:buClr>
+              <a:buFont typeface="Calibri" pitchFamily="34" charset="0"/>
+              <a:buChar char="◦"/>
+              <a:defRPr sz="1400" kern="1200">
+                <a:solidFill>
+                  <a:schemeClr val="tx1">
+                    <a:lumMod val="75000"/>
+                    <a:lumOff val="25000"/>
+                  </a:schemeClr>
+                </a:solidFill>
+                <a:latin typeface="+mn-lt"/>
+                <a:ea typeface="+mn-ea"/>
+                <a:cs typeface="+mn-cs"/>
+              </a:defRPr>
+            </a:lvl3pPr>
+            <a:lvl4pPr marL="749808" indent="-182880" algn="l" defTabSz="914400" rtl="0" eaLnBrk="1" latinLnBrk="0" hangingPunct="1">
+              <a:lnSpc>
+                <a:spcPct val="90000"/>
+              </a:lnSpc>
+              <a:spcBef>
+                <a:spcPts val="200"/>
+              </a:spcBef>
+              <a:spcAft>
+                <a:spcPts val="400"/>
+              </a:spcAft>
+              <a:buClr>
+                <a:schemeClr val="accent1"/>
+              </a:buClr>
+              <a:buFont typeface="Calibri" pitchFamily="34" charset="0"/>
+              <a:buChar char="◦"/>
+              <a:defRPr sz="1400" kern="1200">
+                <a:solidFill>
+                  <a:schemeClr val="tx1">
+                    <a:lumMod val="75000"/>
+                    <a:lumOff val="25000"/>
+                  </a:schemeClr>
+                </a:solidFill>
+                <a:latin typeface="+mn-lt"/>
+                <a:ea typeface="+mn-ea"/>
+                <a:cs typeface="+mn-cs"/>
+              </a:defRPr>
+            </a:lvl4pPr>
+            <a:lvl5pPr marL="932688" indent="-182880" algn="l" defTabSz="914400" rtl="0" eaLnBrk="1" latinLnBrk="0" hangingPunct="1">
+              <a:lnSpc>
+                <a:spcPct val="90000"/>
+              </a:lnSpc>
+              <a:spcBef>
+                <a:spcPts val="200"/>
+              </a:spcBef>
+              <a:spcAft>
+                <a:spcPts val="400"/>
+              </a:spcAft>
+              <a:buClr>
+                <a:schemeClr val="accent1"/>
+              </a:buClr>
+              <a:buFont typeface="Calibri" pitchFamily="34" charset="0"/>
+              <a:buChar char="◦"/>
+              <a:defRPr sz="1400" kern="1200">
+                <a:solidFill>
+                  <a:schemeClr val="tx1">
+                    <a:lumMod val="75000"/>
+                    <a:lumOff val="25000"/>
+                  </a:schemeClr>
+                </a:solidFill>
+                <a:latin typeface="+mn-lt"/>
+                <a:ea typeface="+mn-ea"/>
+                <a:cs typeface="+mn-cs"/>
+              </a:defRPr>
+            </a:lvl5pPr>
+            <a:lvl6pPr marL="1100000" indent="-228600" algn="l" defTabSz="914400" rtl="0" eaLnBrk="1" latinLnBrk="0" hangingPunct="1">
+              <a:lnSpc>
+                <a:spcPct val="90000"/>
+              </a:lnSpc>
+              <a:spcBef>
+                <a:spcPts val="200"/>
+              </a:spcBef>
+              <a:spcAft>
+                <a:spcPts val="400"/>
+              </a:spcAft>
+              <a:buClr>
+                <a:schemeClr val="accent1"/>
+              </a:buClr>
+              <a:buFont typeface="Calibri" pitchFamily="34" charset="0"/>
+              <a:buChar char="◦"/>
+              <a:defRPr sz="1400" kern="1200">
+                <a:solidFill>
+                  <a:schemeClr val="tx1">
+                    <a:lumMod val="75000"/>
+                    <a:lumOff val="25000"/>
+                  </a:schemeClr>
+                </a:solidFill>
+                <a:latin typeface="+mn-lt"/>
+                <a:ea typeface="+mn-ea"/>
+                <a:cs typeface="+mn-cs"/>
+              </a:defRPr>
+            </a:lvl6pPr>
+            <a:lvl7pPr marL="1300000" indent="-228600" algn="l" defTabSz="914400" rtl="0" eaLnBrk="1" latinLnBrk="0" hangingPunct="1">
+              <a:lnSpc>
+                <a:spcPct val="90000"/>
+              </a:lnSpc>
+              <a:spcBef>
+                <a:spcPts val="200"/>
+              </a:spcBef>
+              <a:spcAft>
+                <a:spcPts val="400"/>
+              </a:spcAft>
+              <a:buClr>
+                <a:schemeClr val="accent1"/>
+              </a:buClr>
+              <a:buFont typeface="Calibri" pitchFamily="34" charset="0"/>
+              <a:buChar char="◦"/>
+              <a:defRPr sz="1400" kern="1200">
+                <a:solidFill>
+                  <a:schemeClr val="tx1">
+                    <a:lumMod val="75000"/>
+                    <a:lumOff val="25000"/>
+                  </a:schemeClr>
+                </a:solidFill>
+                <a:latin typeface="+mn-lt"/>
+                <a:ea typeface="+mn-ea"/>
+                <a:cs typeface="+mn-cs"/>
+              </a:defRPr>
+            </a:lvl7pPr>
+            <a:lvl8pPr marL="1500000" indent="-228600" algn="l" defTabSz="914400" rtl="0" eaLnBrk="1" latinLnBrk="0" hangingPunct="1">
+              <a:lnSpc>
+                <a:spcPct val="90000"/>
+              </a:lnSpc>
+              <a:spcBef>
+                <a:spcPts val="200"/>
+              </a:spcBef>
+              <a:spcAft>
+                <a:spcPts val="400"/>
+              </a:spcAft>
+              <a:buClr>
+                <a:schemeClr val="accent1"/>
+              </a:buClr>
+              <a:buFont typeface="Calibri" pitchFamily="34" charset="0"/>
+              <a:buChar char="◦"/>
+              <a:defRPr sz="1400" kern="1200">
+                <a:solidFill>
+                  <a:schemeClr val="tx1">
+                    <a:lumMod val="75000"/>
+                    <a:lumOff val="25000"/>
+                  </a:schemeClr>
+                </a:solidFill>
+                <a:latin typeface="+mn-lt"/>
+                <a:ea typeface="+mn-ea"/>
+                <a:cs typeface="+mn-cs"/>
+              </a:defRPr>
+            </a:lvl8pPr>
+            <a:lvl9pPr marL="1700000" indent="-228600" algn="l" defTabSz="914400" rtl="0" eaLnBrk="1" latinLnBrk="0" hangingPunct="1">
+              <a:lnSpc>
+                <a:spcPct val="90000"/>
+              </a:lnSpc>
+              <a:spcBef>
+                <a:spcPts val="200"/>
+              </a:spcBef>
+              <a:spcAft>
+                <a:spcPts val="400"/>
+              </a:spcAft>
+              <a:buClr>
+                <a:schemeClr val="accent1"/>
+              </a:buClr>
+              <a:buFont typeface="Calibri" pitchFamily="34" charset="0"/>
+              <a:buChar char="◦"/>
+              <a:defRPr sz="1400" kern="1200">
+                <a:solidFill>
+                  <a:schemeClr val="tx1">
+                    <a:lumMod val="75000"/>
+                    <a:lumOff val="25000"/>
+                  </a:schemeClr>
+                </a:solidFill>
+                <a:latin typeface="+mn-lt"/>
+                <a:ea typeface="+mn-ea"/>
+                <a:cs typeface="+mn-cs"/>
+              </a:defRPr>
+            </a:lvl9pPr>
+          </a:lstStyle>
+          <a:p>
+            <a:r>
+              <a:rPr lang="tr-TR" sz="2400" dirty="0"/>
+              <a:t>Background: </a:t>
+            </a:r>
+            <a:r>
+              <a:rPr lang="tr-TR" sz="2400" dirty="0" err="1"/>
+              <a:t>red</a:t>
+            </a:r>
+            <a:r>
+              <a:rPr lang="tr-TR" sz="2400" dirty="0"/>
+              <a:t>; yaptığımız zaman aslında şunu yapmış oluruz:</a:t>
+            </a:r>
+          </a:p>
+          <a:p>
+            <a:r>
+              <a:rPr lang="tr-TR" sz="2400" dirty="0"/>
+              <a:t>Background: </a:t>
+            </a:r>
+            <a:r>
+              <a:rPr lang="tr-TR" sz="2400" dirty="0" err="1"/>
+              <a:t>red</a:t>
+            </a:r>
+            <a:r>
+              <a:rPr lang="tr-TR" sz="2400" dirty="0"/>
+              <a:t> </a:t>
+            </a:r>
+            <a:r>
+              <a:rPr lang="tr-TR" sz="2400" dirty="0" err="1"/>
+              <a:t>none</a:t>
+            </a:r>
+            <a:r>
+              <a:rPr lang="tr-TR" sz="2400" dirty="0"/>
+              <a:t> 0% 0% </a:t>
+            </a:r>
+            <a:r>
+              <a:rPr lang="tr-TR" sz="2400" dirty="0" err="1"/>
+              <a:t>auto</a:t>
+            </a:r>
+            <a:r>
+              <a:rPr lang="tr-TR" sz="2400" dirty="0"/>
+              <a:t> </a:t>
+            </a:r>
+            <a:r>
+              <a:rPr lang="tr-TR" sz="2400" dirty="0" err="1"/>
+              <a:t>repeat</a:t>
+            </a:r>
+            <a:r>
+              <a:rPr lang="tr-TR" sz="2400" dirty="0"/>
+              <a:t> </a:t>
+            </a:r>
+            <a:r>
+              <a:rPr lang="tr-TR" sz="2400" dirty="0" err="1"/>
+              <a:t>padding-box</a:t>
+            </a:r>
+            <a:r>
+              <a:rPr lang="tr-TR" sz="2400" dirty="0"/>
+              <a:t> </a:t>
+            </a:r>
+            <a:r>
+              <a:rPr lang="tr-TR" sz="2400" dirty="0" err="1"/>
+              <a:t>border-box</a:t>
+            </a:r>
+            <a:r>
+              <a:rPr lang="tr-TR" sz="2400" dirty="0"/>
+              <a:t> </a:t>
+            </a:r>
+            <a:r>
+              <a:rPr lang="tr-TR" sz="2400" dirty="0" err="1"/>
+              <a:t>scroll</a:t>
+            </a:r>
+            <a:r>
+              <a:rPr lang="tr-TR" sz="2400" dirty="0"/>
+              <a:t>;</a:t>
+            </a:r>
+          </a:p>
+          <a:p>
+            <a:r>
+              <a:rPr lang="tr-TR" sz="2400" dirty="0"/>
+              <a:t>Burada sadece arka plan rengi değişecek ise bu komutu </a:t>
+            </a:r>
+            <a:r>
+              <a:rPr lang="tr-TR" sz="2400" dirty="0" err="1"/>
+              <a:t>kullanabilriz</a:t>
+            </a:r>
+            <a:r>
+              <a:rPr lang="tr-TR" sz="2400" dirty="0"/>
+              <a:t> ancak diğer özellikleri değiştirmek istiyorsak background-</a:t>
+            </a:r>
+            <a:r>
+              <a:rPr lang="tr-TR" sz="2400" dirty="0" err="1"/>
+              <a:t>color</a:t>
+            </a:r>
+            <a:r>
+              <a:rPr lang="tr-TR" sz="2400" dirty="0"/>
+              <a:t> özelliğini kullanmamız gerekir. </a:t>
+            </a:r>
+          </a:p>
+          <a:p>
+            <a:pPr>
+              <a:buFont typeface="Arial" panose="020B0604020202020204" pitchFamily="34" charset="0"/>
+              <a:buChar char="•"/>
+            </a:pPr>
+            <a:endParaRPr lang="tr-TR" sz="1700" dirty="0"/>
+          </a:p>
+        </p:txBody>
+      </p:sp>
+    </p:spTree>
+    <p:extLst>
+      <p:ext uri="{BB962C8B-B14F-4D97-AF65-F5344CB8AC3E}">
+        <p14:creationId xmlns:p14="http://schemas.microsoft.com/office/powerpoint/2010/main" val="310053988"/>
+      </p:ext>
+    </p:extLst>
+  </p:cSld>
+  <p:clrMapOvr>
+    <a:masterClrMapping/>
+  </p:clrMapOvr>
+</p:sld>
+</file>
+
+<file path=ppt/slides/slide11.xml><?xml version="1.0" encoding="utf-8"?>
+<p:sld xmlns:a="http://schemas.openxmlformats.org/drawingml/2006/main" xmlns:r="http://schemas.openxmlformats.org/officeDocument/2006/relationships" xmlns:p="http://schemas.openxmlformats.org/presentationml/2006/main">
+  <p:cSld>
+    <p:bg>
+      <p:bgPr>
+        <a:solidFill>
+          <a:schemeClr val="bg1"/>
+        </a:solidFill>
+        <a:effectLst/>
+      </p:bgPr>
+    </p:bg>
+    <p:spTree>
+      <p:nvGrpSpPr>
+        <p:cNvPr id="1" name=""/>
+        <p:cNvGrpSpPr/>
+        <p:nvPr/>
+      </p:nvGrpSpPr>
+      <p:grpSpPr>
+        <a:xfrm>
+          <a:off x="0" y="0"/>
+          <a:ext cx="0" cy="0"/>
+          <a:chOff x="0" y="0"/>
+          <a:chExt cx="0" cy="0"/>
+        </a:xfrm>
+      </p:grpSpPr>
+      <p:sp>
+        <p:nvSpPr>
+          <p:cNvPr id="5" name="Başlık 4">
+            <a:extLst>
+              <a:ext uri="{FF2B5EF4-FFF2-40B4-BE49-F238E27FC236}">
+                <a16:creationId xmlns:a16="http://schemas.microsoft.com/office/drawing/2014/main" id="{8E1A63B1-2AEE-1610-F2F9-D348CF2BC159}"/>
+              </a:ext>
+            </a:extLst>
+          </p:cNvPr>
+          <p:cNvSpPr>
+            <a:spLocks noGrp="1"/>
+          </p:cNvSpPr>
+          <p:nvPr>
+            <p:ph type="title"/>
+          </p:nvPr>
+        </p:nvSpPr>
+        <p:spPr>
+          <a:xfrm>
+            <a:off x="1097280" y="286603"/>
+            <a:ext cx="10058400" cy="1450757"/>
+          </a:xfrm>
+        </p:spPr>
+        <p:txBody>
+          <a:bodyPr>
+            <a:normAutofit/>
+          </a:bodyPr>
+          <a:lstStyle/>
+          <a:p>
+            <a:r>
+              <a:rPr lang="tr-TR" dirty="0" err="1"/>
+              <a:t>Sweet</a:t>
+            </a:r>
+            <a:r>
+              <a:rPr lang="tr-TR" dirty="0"/>
+              <a:t> </a:t>
+            </a:r>
+            <a:r>
+              <a:rPr lang="tr-TR" dirty="0" err="1"/>
+              <a:t>alert</a:t>
+            </a:r>
+            <a:endParaRPr lang="tr-TR" dirty="0"/>
+          </a:p>
+        </p:txBody>
+      </p:sp>
+      <p:sp>
+        <p:nvSpPr>
+          <p:cNvPr id="4" name="İçerik Yer Tutucusu 2">
+            <a:extLst>
+              <a:ext uri="{FF2B5EF4-FFF2-40B4-BE49-F238E27FC236}">
+                <a16:creationId xmlns:a16="http://schemas.microsoft.com/office/drawing/2014/main" id="{9A010DE7-FDF1-FD4B-8A79-ABB33BFC4B62}"/>
+              </a:ext>
+            </a:extLst>
+          </p:cNvPr>
+          <p:cNvSpPr txBox="1">
+            <a:spLocks/>
+          </p:cNvSpPr>
+          <p:nvPr/>
+        </p:nvSpPr>
+        <p:spPr>
+          <a:xfrm>
+            <a:off x="1097280" y="1845734"/>
+            <a:ext cx="10647877" cy="4023360"/>
+          </a:xfrm>
+          <a:prstGeom prst="rect">
+            <a:avLst/>
+          </a:prstGeom>
+        </p:spPr>
+        <p:txBody>
+          <a:bodyPr vert="horz" lIns="0" tIns="45720" rIns="0" bIns="45720" rtlCol="0">
+            <a:normAutofit/>
+          </a:bodyPr>
+          <a:lstStyle>
+            <a:lvl1pPr marL="91440" indent="-91440" algn="l" defTabSz="914400" rtl="0" eaLnBrk="1" latinLnBrk="0" hangingPunct="1">
+              <a:lnSpc>
+                <a:spcPct val="90000"/>
+              </a:lnSpc>
+              <a:spcBef>
+                <a:spcPts val="1200"/>
+              </a:spcBef>
+              <a:spcAft>
+                <a:spcPts val="200"/>
+              </a:spcAft>
+              <a:buClr>
+                <a:schemeClr val="accent1"/>
+              </a:buClr>
+              <a:buSzPct val="100000"/>
+              <a:buFont typeface="Calibri" panose="020F0502020204030204" pitchFamily="34" charset="0"/>
+              <a:buChar char=" "/>
+              <a:defRPr sz="2000" kern="1200">
+                <a:solidFill>
+                  <a:schemeClr val="tx1">
+                    <a:lumMod val="75000"/>
+                    <a:lumOff val="25000"/>
+                  </a:schemeClr>
+                </a:solidFill>
+                <a:latin typeface="+mn-lt"/>
+                <a:ea typeface="+mn-ea"/>
+                <a:cs typeface="+mn-cs"/>
+              </a:defRPr>
+            </a:lvl1pPr>
+            <a:lvl2pPr marL="384048" indent="-182880" algn="l" defTabSz="914400" rtl="0" eaLnBrk="1" latinLnBrk="0" hangingPunct="1">
+              <a:lnSpc>
+                <a:spcPct val="90000"/>
+              </a:lnSpc>
+              <a:spcBef>
+                <a:spcPts val="200"/>
+              </a:spcBef>
+              <a:spcAft>
+                <a:spcPts val="400"/>
+              </a:spcAft>
+              <a:buClr>
+                <a:schemeClr val="accent1"/>
+              </a:buClr>
+              <a:buFont typeface="Calibri" pitchFamily="34" charset="0"/>
+              <a:buChar char="◦"/>
+              <a:defRPr sz="1800" kern="1200">
+                <a:solidFill>
+                  <a:schemeClr val="tx1">
+                    <a:lumMod val="75000"/>
+                    <a:lumOff val="25000"/>
+                  </a:schemeClr>
+                </a:solidFill>
+                <a:latin typeface="+mn-lt"/>
+                <a:ea typeface="+mn-ea"/>
+                <a:cs typeface="+mn-cs"/>
+              </a:defRPr>
+            </a:lvl2pPr>
+            <a:lvl3pPr marL="566928" indent="-182880" algn="l" defTabSz="914400" rtl="0" eaLnBrk="1" latinLnBrk="0" hangingPunct="1">
+              <a:lnSpc>
+                <a:spcPct val="90000"/>
+              </a:lnSpc>
+              <a:spcBef>
+                <a:spcPts val="200"/>
+              </a:spcBef>
+              <a:spcAft>
+                <a:spcPts val="400"/>
+              </a:spcAft>
+              <a:buClr>
+                <a:schemeClr val="accent1"/>
+              </a:buClr>
+              <a:buFont typeface="Calibri" pitchFamily="34" charset="0"/>
+              <a:buChar char="◦"/>
+              <a:defRPr sz="1400" kern="1200">
+                <a:solidFill>
+                  <a:schemeClr val="tx1">
+                    <a:lumMod val="75000"/>
+                    <a:lumOff val="25000"/>
+                  </a:schemeClr>
+                </a:solidFill>
+                <a:latin typeface="+mn-lt"/>
+                <a:ea typeface="+mn-ea"/>
+                <a:cs typeface="+mn-cs"/>
+              </a:defRPr>
+            </a:lvl3pPr>
+            <a:lvl4pPr marL="749808" indent="-182880" algn="l" defTabSz="914400" rtl="0" eaLnBrk="1" latinLnBrk="0" hangingPunct="1">
+              <a:lnSpc>
+                <a:spcPct val="90000"/>
+              </a:lnSpc>
+              <a:spcBef>
+                <a:spcPts val="200"/>
+              </a:spcBef>
+              <a:spcAft>
+                <a:spcPts val="400"/>
+              </a:spcAft>
+              <a:buClr>
+                <a:schemeClr val="accent1"/>
+              </a:buClr>
+              <a:buFont typeface="Calibri" pitchFamily="34" charset="0"/>
+              <a:buChar char="◦"/>
+              <a:defRPr sz="1400" kern="1200">
+                <a:solidFill>
+                  <a:schemeClr val="tx1">
+                    <a:lumMod val="75000"/>
+                    <a:lumOff val="25000"/>
+                  </a:schemeClr>
+                </a:solidFill>
+                <a:latin typeface="+mn-lt"/>
+                <a:ea typeface="+mn-ea"/>
+                <a:cs typeface="+mn-cs"/>
+              </a:defRPr>
+            </a:lvl4pPr>
+            <a:lvl5pPr marL="932688" indent="-182880" algn="l" defTabSz="914400" rtl="0" eaLnBrk="1" latinLnBrk="0" hangingPunct="1">
+              <a:lnSpc>
+                <a:spcPct val="90000"/>
+              </a:lnSpc>
+              <a:spcBef>
+                <a:spcPts val="200"/>
+              </a:spcBef>
+              <a:spcAft>
+                <a:spcPts val="400"/>
+              </a:spcAft>
+              <a:buClr>
+                <a:schemeClr val="accent1"/>
+              </a:buClr>
+              <a:buFont typeface="Calibri" pitchFamily="34" charset="0"/>
+              <a:buChar char="◦"/>
+              <a:defRPr sz="1400" kern="1200">
+                <a:solidFill>
+                  <a:schemeClr val="tx1">
+                    <a:lumMod val="75000"/>
+                    <a:lumOff val="25000"/>
+                  </a:schemeClr>
+                </a:solidFill>
+                <a:latin typeface="+mn-lt"/>
+                <a:ea typeface="+mn-ea"/>
+                <a:cs typeface="+mn-cs"/>
+              </a:defRPr>
+            </a:lvl5pPr>
+            <a:lvl6pPr marL="1100000" indent="-228600" algn="l" defTabSz="914400" rtl="0" eaLnBrk="1" latinLnBrk="0" hangingPunct="1">
+              <a:lnSpc>
+                <a:spcPct val="90000"/>
+              </a:lnSpc>
+              <a:spcBef>
+                <a:spcPts val="200"/>
+              </a:spcBef>
+              <a:spcAft>
+                <a:spcPts val="400"/>
+              </a:spcAft>
+              <a:buClr>
+                <a:schemeClr val="accent1"/>
+              </a:buClr>
+              <a:buFont typeface="Calibri" pitchFamily="34" charset="0"/>
+              <a:buChar char="◦"/>
+              <a:defRPr sz="1400" kern="1200">
+                <a:solidFill>
+                  <a:schemeClr val="tx1">
+                    <a:lumMod val="75000"/>
+                    <a:lumOff val="25000"/>
+                  </a:schemeClr>
+                </a:solidFill>
+                <a:latin typeface="+mn-lt"/>
+                <a:ea typeface="+mn-ea"/>
+                <a:cs typeface="+mn-cs"/>
+              </a:defRPr>
+            </a:lvl6pPr>
+            <a:lvl7pPr marL="1300000" indent="-228600" algn="l" defTabSz="914400" rtl="0" eaLnBrk="1" latinLnBrk="0" hangingPunct="1">
+              <a:lnSpc>
+                <a:spcPct val="90000"/>
+              </a:lnSpc>
+              <a:spcBef>
+                <a:spcPts val="200"/>
+              </a:spcBef>
+              <a:spcAft>
+                <a:spcPts val="400"/>
+              </a:spcAft>
+              <a:buClr>
+                <a:schemeClr val="accent1"/>
+              </a:buClr>
+              <a:buFont typeface="Calibri" pitchFamily="34" charset="0"/>
+              <a:buChar char="◦"/>
+              <a:defRPr sz="1400" kern="1200">
+                <a:solidFill>
+                  <a:schemeClr val="tx1">
+                    <a:lumMod val="75000"/>
+                    <a:lumOff val="25000"/>
+                  </a:schemeClr>
+                </a:solidFill>
+                <a:latin typeface="+mn-lt"/>
+                <a:ea typeface="+mn-ea"/>
+                <a:cs typeface="+mn-cs"/>
+              </a:defRPr>
+            </a:lvl7pPr>
+            <a:lvl8pPr marL="1500000" indent="-228600" algn="l" defTabSz="914400" rtl="0" eaLnBrk="1" latinLnBrk="0" hangingPunct="1">
+              <a:lnSpc>
+                <a:spcPct val="90000"/>
+              </a:lnSpc>
+              <a:spcBef>
+                <a:spcPts val="200"/>
+              </a:spcBef>
+              <a:spcAft>
+                <a:spcPts val="400"/>
+              </a:spcAft>
+              <a:buClr>
+                <a:schemeClr val="accent1"/>
+              </a:buClr>
+              <a:buFont typeface="Calibri" pitchFamily="34" charset="0"/>
+              <a:buChar char="◦"/>
+              <a:defRPr sz="1400" kern="1200">
+                <a:solidFill>
+                  <a:schemeClr val="tx1">
+                    <a:lumMod val="75000"/>
+                    <a:lumOff val="25000"/>
+                  </a:schemeClr>
+                </a:solidFill>
+                <a:latin typeface="+mn-lt"/>
+                <a:ea typeface="+mn-ea"/>
+                <a:cs typeface="+mn-cs"/>
+              </a:defRPr>
+            </a:lvl8pPr>
+            <a:lvl9pPr marL="1700000" indent="-228600" algn="l" defTabSz="914400" rtl="0" eaLnBrk="1" latinLnBrk="0" hangingPunct="1">
+              <a:lnSpc>
+                <a:spcPct val="90000"/>
+              </a:lnSpc>
+              <a:spcBef>
+                <a:spcPts val="200"/>
+              </a:spcBef>
+              <a:spcAft>
+                <a:spcPts val="400"/>
+              </a:spcAft>
+              <a:buClr>
+                <a:schemeClr val="accent1"/>
+              </a:buClr>
+              <a:buFont typeface="Calibri" pitchFamily="34" charset="0"/>
+              <a:buChar char="◦"/>
+              <a:defRPr sz="1400" kern="1200">
+                <a:solidFill>
+                  <a:schemeClr val="tx1">
+                    <a:lumMod val="75000"/>
+                    <a:lumOff val="25000"/>
+                  </a:schemeClr>
+                </a:solidFill>
+                <a:latin typeface="+mn-lt"/>
+                <a:ea typeface="+mn-ea"/>
+                <a:cs typeface="+mn-cs"/>
+              </a:defRPr>
+            </a:lvl9pPr>
+          </a:lstStyle>
+          <a:p>
+            <a:r>
+              <a:rPr lang="tr-TR" sz="2400" dirty="0" err="1"/>
+              <a:t>Sweet</a:t>
+            </a:r>
+            <a:r>
+              <a:rPr lang="tr-TR" sz="2400" dirty="0"/>
+              <a:t> </a:t>
+            </a:r>
+            <a:r>
+              <a:rPr lang="tr-TR" sz="2400" dirty="0" err="1"/>
+              <a:t>alert</a:t>
+            </a:r>
+            <a:r>
+              <a:rPr lang="tr-TR" sz="2400" dirty="0"/>
+              <a:t>, yaptığımız projelerde bir uyarı penceresi veya bilgilendirme kutusu açılıyor ise bunu daha güzel ve kullanışlı bir hale getirmek için kullandığımız açık kaynak kodlu eklentidir. </a:t>
+            </a:r>
+          </a:p>
+          <a:p>
+            <a:r>
+              <a:rPr lang="tr-TR" sz="2400" dirty="0" err="1"/>
+              <a:t>Sweet</a:t>
+            </a:r>
+            <a:r>
+              <a:rPr lang="tr-TR" sz="2400" dirty="0"/>
+              <a:t> </a:t>
+            </a:r>
+            <a:r>
+              <a:rPr lang="tr-TR" sz="2400" dirty="0" err="1"/>
+              <a:t>alert</a:t>
+            </a:r>
+            <a:r>
+              <a:rPr lang="tr-TR" sz="2400" dirty="0"/>
+              <a:t> kütüphanesini CDN bağlantısı veya indirerek kullanabiliriz. </a:t>
+            </a:r>
+          </a:p>
+          <a:p>
+            <a:pPr>
+              <a:buFont typeface="Arial" panose="020B0604020202020204" pitchFamily="34" charset="0"/>
+              <a:buChar char="•"/>
+            </a:pPr>
+            <a:endParaRPr lang="tr-TR" sz="1700" dirty="0"/>
+          </a:p>
+        </p:txBody>
+      </p:sp>
+    </p:spTree>
+    <p:extLst>
+      <p:ext uri="{BB962C8B-B14F-4D97-AF65-F5344CB8AC3E}">
+        <p14:creationId xmlns:p14="http://schemas.microsoft.com/office/powerpoint/2010/main" val="593451167"/>
+      </p:ext>
+    </p:extLst>
+  </p:cSld>
+  <p:clrMapOvr>
+    <a:masterClrMapping/>
+  </p:clrMapOvr>
+</p:sld>
+</file>
+
 <file path=ppt/slides/slide2.xml><?xml version="1.0" encoding="utf-8"?>
 <p:sld xmlns:a="http://schemas.openxmlformats.org/drawingml/2006/main" xmlns:r="http://schemas.openxmlformats.org/officeDocument/2006/relationships" xmlns:p="http://schemas.openxmlformats.org/presentationml/2006/main">
   <p:cSld>
@@ -5673,6 +6698,858 @@
     <p:extLst>
       <p:ext uri="{BB962C8B-B14F-4D97-AF65-F5344CB8AC3E}">
         <p14:creationId xmlns:p14="http://schemas.microsoft.com/office/powerpoint/2010/main" val="1175695392"/>
+      </p:ext>
+    </p:extLst>
+  </p:cSld>
+  <p:clrMapOvr>
+    <a:masterClrMapping/>
+  </p:clrMapOvr>
+</p:sld>
+</file>
+
+<file path=ppt/slides/slide8.xml><?xml version="1.0" encoding="utf-8"?>
+<p:sld xmlns:a="http://schemas.openxmlformats.org/drawingml/2006/main" xmlns:r="http://schemas.openxmlformats.org/officeDocument/2006/relationships" xmlns:p="http://schemas.openxmlformats.org/presentationml/2006/main">
+  <p:cSld>
+    <p:bg>
+      <p:bgPr>
+        <a:solidFill>
+          <a:schemeClr val="bg1"/>
+        </a:solidFill>
+        <a:effectLst/>
+      </p:bgPr>
+    </p:bg>
+    <p:spTree>
+      <p:nvGrpSpPr>
+        <p:cNvPr id="1" name=""/>
+        <p:cNvGrpSpPr/>
+        <p:nvPr/>
+      </p:nvGrpSpPr>
+      <p:grpSpPr>
+        <a:xfrm>
+          <a:off x="0" y="0"/>
+          <a:ext cx="0" cy="0"/>
+          <a:chOff x="0" y="0"/>
+          <a:chExt cx="0" cy="0"/>
+        </a:xfrm>
+      </p:grpSpPr>
+      <p:sp useBgFill="1">
+        <p:nvSpPr>
+          <p:cNvPr id="8" name="Rectangle 7">
+            <a:extLst>
+              <a:ext uri="{FF2B5EF4-FFF2-40B4-BE49-F238E27FC236}">
+                <a16:creationId xmlns:a16="http://schemas.microsoft.com/office/drawing/2014/main" id="{3741B58E-3B65-4A01-A276-975AB2CF8A08}"/>
+              </a:ext>
+              <a:ext uri="{C183D7F6-B498-43B3-948B-1728B52AA6E4}">
+                <adec:decorative xmlns:adec="http://schemas.microsoft.com/office/drawing/2017/decorative" val="1"/>
+              </a:ext>
+            </a:extLst>
+          </p:cNvPr>
+          <p:cNvSpPr>
+            <a:spLocks noGrp="1" noRot="1" noChangeAspect="1" noMove="1" noResize="1" noEditPoints="1" noAdjustHandles="1" noChangeArrowheads="1" noChangeShapeType="1" noTextEdit="1"/>
+          </p:cNvSpPr>
+          <p:nvPr>
+            <p:extLst>
+              <p:ext uri="{386F3935-93C4-4BCD-93E2-E3B085C9AB24}">
+                <p16:designElem xmlns:p16="http://schemas.microsoft.com/office/powerpoint/2015/main" val="1"/>
+              </p:ext>
+            </p:extLst>
+          </p:nvPr>
+        </p:nvSpPr>
+        <p:spPr>
+          <a:xfrm>
+            <a:off x="0" y="0"/>
+            <a:ext cx="12186315" cy="6858000"/>
+          </a:xfrm>
+          <a:prstGeom prst="rect">
+            <a:avLst/>
+          </a:prstGeom>
+          <a:ln>
+            <a:noFill/>
+          </a:ln>
+        </p:spPr>
+        <p:style>
+          <a:lnRef idx="2">
+            <a:schemeClr val="accent6">
+              <a:shade val="50000"/>
+            </a:schemeClr>
+          </a:lnRef>
+          <a:fillRef idx="1001">
+            <a:schemeClr val="lt1"/>
+          </a:fillRef>
+          <a:effectRef idx="0">
+            <a:schemeClr val="accent6"/>
+          </a:effectRef>
+          <a:fontRef idx="minor">
+            <a:schemeClr val="lt1"/>
+          </a:fontRef>
+        </p:style>
+        <p:txBody>
+          <a:bodyPr rtlCol="0" anchor="ctr"/>
+          <a:lstStyle/>
+          <a:p>
+            <a:pPr algn="ctr"/>
+            <a:endParaRPr lang="en-US"/>
+          </a:p>
+        </p:txBody>
+      </p:sp>
+      <p:sp>
+        <p:nvSpPr>
+          <p:cNvPr id="10" name="Rectangle 9">
+            <a:extLst>
+              <a:ext uri="{FF2B5EF4-FFF2-40B4-BE49-F238E27FC236}">
+                <a16:creationId xmlns:a16="http://schemas.microsoft.com/office/drawing/2014/main" id="{7AAC67C3-831B-4AB1-A259-DFB839CAFAFC}"/>
+              </a:ext>
+              <a:ext uri="{C183D7F6-B498-43B3-948B-1728B52AA6E4}">
+                <adec:decorative xmlns:adec="http://schemas.microsoft.com/office/drawing/2017/decorative" val="1"/>
+              </a:ext>
+            </a:extLst>
+          </p:cNvPr>
+          <p:cNvSpPr>
+            <a:spLocks noGrp="1" noRot="1" noChangeAspect="1" noMove="1" noResize="1" noEditPoints="1" noAdjustHandles="1" noChangeArrowheads="1" noChangeShapeType="1" noTextEdit="1"/>
+          </p:cNvSpPr>
+          <p:nvPr>
+            <p:extLst>
+              <p:ext uri="{386F3935-93C4-4BCD-93E2-E3B085C9AB24}">
+                <p16:designElem xmlns:p16="http://schemas.microsoft.com/office/powerpoint/2015/main" val="1"/>
+              </p:ext>
+            </p:extLst>
+          </p:nvPr>
+        </p:nvSpPr>
+        <p:spPr>
+          <a:xfrm>
+            <a:off x="16" y="0"/>
+            <a:ext cx="4050791" cy="6858000"/>
+          </a:xfrm>
+          <a:prstGeom prst="rect">
+            <a:avLst/>
+          </a:prstGeom>
+          <a:solidFill>
+            <a:schemeClr val="accent2"/>
+          </a:solidFill>
+          <a:ln>
+            <a:noFill/>
+          </a:ln>
+        </p:spPr>
+        <p:style>
+          <a:lnRef idx="2">
+            <a:schemeClr val="accent1">
+              <a:shade val="50000"/>
+            </a:schemeClr>
+          </a:lnRef>
+          <a:fillRef idx="1">
+            <a:schemeClr val="accent1"/>
+          </a:fillRef>
+          <a:effectRef idx="0">
+            <a:schemeClr val="accent1"/>
+          </a:effectRef>
+          <a:fontRef idx="minor">
+            <a:schemeClr val="lt1"/>
+          </a:fontRef>
+        </p:style>
+      </p:sp>
+      <p:sp>
+        <p:nvSpPr>
+          <p:cNvPr id="2" name="Başlık 1">
+            <a:extLst>
+              <a:ext uri="{FF2B5EF4-FFF2-40B4-BE49-F238E27FC236}">
+                <a16:creationId xmlns:a16="http://schemas.microsoft.com/office/drawing/2014/main" id="{4232ECDD-CA44-1766-8825-2198B1F68C7C}"/>
+              </a:ext>
+            </a:extLst>
+          </p:cNvPr>
+          <p:cNvSpPr>
+            <a:spLocks noGrp="1"/>
+          </p:cNvSpPr>
+          <p:nvPr>
+            <p:ph type="title"/>
+          </p:nvPr>
+        </p:nvSpPr>
+        <p:spPr>
+          <a:xfrm>
+            <a:off x="492370" y="605896"/>
+            <a:ext cx="3084844" cy="5646208"/>
+          </a:xfrm>
+        </p:spPr>
+        <p:txBody>
+          <a:bodyPr anchor="ctr">
+            <a:normAutofit/>
+          </a:bodyPr>
+          <a:lstStyle/>
+          <a:p>
+            <a:r>
+              <a:rPr lang="tr-TR" sz="3600" dirty="0">
+                <a:solidFill>
+                  <a:srgbClr val="FFFFFF"/>
+                </a:solidFill>
+              </a:rPr>
+              <a:t>4. Eğitim Günü Araştırma Ödevi</a:t>
+            </a:r>
+          </a:p>
+        </p:txBody>
+      </p:sp>
+      <p:sp>
+        <p:nvSpPr>
+          <p:cNvPr id="12" name="Rectangle 11">
+            <a:extLst>
+              <a:ext uri="{FF2B5EF4-FFF2-40B4-BE49-F238E27FC236}">
+                <a16:creationId xmlns:a16="http://schemas.microsoft.com/office/drawing/2014/main" id="{054B3F04-9EAC-45C0-B3CE-0387EEA10A0C}"/>
+              </a:ext>
+              <a:ext uri="{C183D7F6-B498-43B3-948B-1728B52AA6E4}">
+                <adec:decorative xmlns:adec="http://schemas.microsoft.com/office/drawing/2017/decorative" val="1"/>
+              </a:ext>
+            </a:extLst>
+          </p:cNvPr>
+          <p:cNvSpPr>
+            <a:spLocks noGrp="1" noRot="1" noChangeAspect="1" noMove="1" noResize="1" noEditPoints="1" noAdjustHandles="1" noChangeArrowheads="1" noChangeShapeType="1" noTextEdit="1"/>
+          </p:cNvSpPr>
+          <p:nvPr>
+            <p:extLst>
+              <p:ext uri="{386F3935-93C4-4BCD-93E2-E3B085C9AB24}">
+                <p16:designElem xmlns:p16="http://schemas.microsoft.com/office/powerpoint/2015/main" val="1"/>
+              </p:ext>
+            </p:extLst>
+          </p:nvPr>
+        </p:nvSpPr>
+        <p:spPr>
+          <a:xfrm>
+            <a:off x="4040071" y="0"/>
+            <a:ext cx="64008" cy="6858000"/>
+          </a:xfrm>
+          <a:prstGeom prst="rect">
+            <a:avLst/>
+          </a:prstGeom>
+          <a:solidFill>
+            <a:schemeClr val="accent1"/>
+          </a:solidFill>
+          <a:ln>
+            <a:noFill/>
+          </a:ln>
+        </p:spPr>
+        <p:style>
+          <a:lnRef idx="2">
+            <a:schemeClr val="accent1">
+              <a:shade val="50000"/>
+            </a:schemeClr>
+          </a:lnRef>
+          <a:fillRef idx="1">
+            <a:schemeClr val="accent1"/>
+          </a:fillRef>
+          <a:effectRef idx="0">
+            <a:schemeClr val="accent1"/>
+          </a:effectRef>
+          <a:fontRef idx="minor">
+            <a:schemeClr val="lt1"/>
+          </a:fontRef>
+        </p:style>
+      </p:sp>
+      <p:sp>
+        <p:nvSpPr>
+          <p:cNvPr id="4" name="Metin kutusu 3">
+            <a:extLst>
+              <a:ext uri="{FF2B5EF4-FFF2-40B4-BE49-F238E27FC236}">
+                <a16:creationId xmlns:a16="http://schemas.microsoft.com/office/drawing/2014/main" id="{546A8742-ED03-19F6-B5A8-A9478B93F691}"/>
+              </a:ext>
+            </a:extLst>
+          </p:cNvPr>
+          <p:cNvSpPr txBox="1"/>
+          <p:nvPr/>
+        </p:nvSpPr>
+        <p:spPr>
+          <a:xfrm>
+            <a:off x="4345548" y="1080857"/>
+            <a:ext cx="7492753" cy="4696286"/>
+          </a:xfrm>
+          <a:prstGeom prst="rect">
+            <a:avLst/>
+          </a:prstGeom>
+          <a:noFill/>
+        </p:spPr>
+        <p:txBody>
+          <a:bodyPr wrap="square" rtlCol="0">
+            <a:spAutoFit/>
+          </a:bodyPr>
+          <a:lstStyle/>
+          <a:p>
+            <a:pPr algn="ctr"/>
+            <a:r>
+              <a:rPr lang="tr-TR" b="1" u="sng" dirty="0" err="1"/>
+              <a:t>Text-reset</a:t>
+            </a:r>
+            <a:endParaRPr lang="tr-TR" b="1" u="sng" dirty="0"/>
+          </a:p>
+          <a:p>
+            <a:pPr algn="ctr"/>
+            <a:endParaRPr lang="tr-TR" b="1" u="sng" dirty="0"/>
+          </a:p>
+          <a:p>
+            <a:pPr>
+              <a:lnSpc>
+                <a:spcPct val="107000"/>
+              </a:lnSpc>
+              <a:spcAft>
+                <a:spcPts val="800"/>
+              </a:spcAft>
+            </a:pPr>
+            <a:r>
+              <a:rPr lang="tr-TR" sz="1800" dirty="0" err="1">
+                <a:effectLst/>
+                <a:latin typeface="Calibri" panose="020F0502020204030204" pitchFamily="34" charset="0"/>
+                <a:ea typeface="Calibri" panose="020F0502020204030204" pitchFamily="34" charset="0"/>
+                <a:cs typeface="Times New Roman" panose="02020603050405020304" pitchFamily="18" charset="0"/>
+              </a:rPr>
+              <a:t>Bootstrap</a:t>
+            </a:r>
+            <a:r>
+              <a:rPr lang="tr-TR" sz="1800" dirty="0">
+                <a:effectLst/>
+                <a:latin typeface="Calibri" panose="020F0502020204030204" pitchFamily="34" charset="0"/>
+                <a:ea typeface="Calibri" panose="020F0502020204030204" pitchFamily="34" charset="0"/>
+                <a:cs typeface="Times New Roman" panose="02020603050405020304" pitchFamily="18" charset="0"/>
+              </a:rPr>
+              <a:t> komutları içerisinde yer alan ve metinleri düzenlememize yardımcı olan, </a:t>
+            </a:r>
+            <a:r>
+              <a:rPr lang="tr-TR" sz="1800" dirty="0" err="1">
+                <a:effectLst/>
+                <a:latin typeface="Calibri" panose="020F0502020204030204" pitchFamily="34" charset="0"/>
+                <a:ea typeface="Calibri" panose="020F0502020204030204" pitchFamily="34" charset="0"/>
+                <a:cs typeface="Times New Roman" panose="02020603050405020304" pitchFamily="18" charset="0"/>
+              </a:rPr>
+              <a:t>Text-reset</a:t>
+            </a:r>
+            <a:r>
+              <a:rPr lang="tr-TR" sz="1800" dirty="0">
+                <a:effectLst/>
+                <a:latin typeface="Calibri" panose="020F0502020204030204" pitchFamily="34" charset="0"/>
+                <a:ea typeface="Calibri" panose="020F0502020204030204" pitchFamily="34" charset="0"/>
+                <a:cs typeface="Times New Roman" panose="02020603050405020304" pitchFamily="18" charset="0"/>
+              </a:rPr>
+              <a:t> komutu bir </a:t>
+            </a:r>
+            <a:r>
+              <a:rPr lang="tr-TR" sz="1800" dirty="0" err="1">
+                <a:effectLst/>
+                <a:latin typeface="Calibri" panose="020F0502020204030204" pitchFamily="34" charset="0"/>
+                <a:ea typeface="Calibri" panose="020F0502020204030204" pitchFamily="34" charset="0"/>
+                <a:cs typeface="Times New Roman" panose="02020603050405020304" pitchFamily="18" charset="0"/>
+              </a:rPr>
+              <a:t>text'in</a:t>
+            </a:r>
+            <a:r>
+              <a:rPr lang="tr-TR" sz="1800" dirty="0">
+                <a:effectLst/>
+                <a:latin typeface="Calibri" panose="020F0502020204030204" pitchFamily="34" charset="0"/>
+                <a:ea typeface="Calibri" panose="020F0502020204030204" pitchFamily="34" charset="0"/>
+                <a:cs typeface="Times New Roman" panose="02020603050405020304" pitchFamily="18" charset="0"/>
+              </a:rPr>
+              <a:t> ya da linkin rengini sıfırlamamıza yarar. Bu komutu kullandıktan sonra kullandığım element rengini üst ögeden yani </a:t>
+            </a:r>
+            <a:r>
+              <a:rPr lang="tr-TR" sz="1800" dirty="0" err="1">
+                <a:effectLst/>
+                <a:latin typeface="Calibri" panose="020F0502020204030204" pitchFamily="34" charset="0"/>
+                <a:ea typeface="Calibri" panose="020F0502020204030204" pitchFamily="34" charset="0"/>
+                <a:cs typeface="Times New Roman" panose="02020603050405020304" pitchFamily="18" charset="0"/>
+              </a:rPr>
+              <a:t>parent'dan</a:t>
+            </a:r>
+            <a:r>
+              <a:rPr lang="tr-TR" sz="1800" dirty="0">
+                <a:effectLst/>
+                <a:latin typeface="Calibri" panose="020F0502020204030204" pitchFamily="34" charset="0"/>
+                <a:ea typeface="Calibri" panose="020F0502020204030204" pitchFamily="34" charset="0"/>
+                <a:cs typeface="Times New Roman" panose="02020603050405020304" pitchFamily="18" charset="0"/>
+              </a:rPr>
+              <a:t> alır.</a:t>
+            </a:r>
+          </a:p>
+          <a:p>
+            <a:pPr>
+              <a:lnSpc>
+                <a:spcPct val="107000"/>
+              </a:lnSpc>
+              <a:spcAft>
+                <a:spcPts val="800"/>
+              </a:spcAft>
+            </a:pPr>
+            <a:r>
+              <a:rPr lang="tr-TR" sz="1800" dirty="0">
+                <a:effectLst/>
+                <a:latin typeface="Calibri" panose="020F0502020204030204" pitchFamily="34" charset="0"/>
+                <a:ea typeface="Calibri" panose="020F0502020204030204" pitchFamily="34" charset="0"/>
+                <a:cs typeface="Times New Roman" panose="02020603050405020304" pitchFamily="18" charset="0"/>
+              </a:rPr>
+              <a:t>Bunun yanında </a:t>
+            </a:r>
+            <a:r>
+              <a:rPr lang="tr-TR" sz="1800" dirty="0" err="1">
+                <a:effectLst/>
+                <a:latin typeface="Calibri" panose="020F0502020204030204" pitchFamily="34" charset="0"/>
+                <a:ea typeface="Calibri" panose="020F0502020204030204" pitchFamily="34" charset="0"/>
+                <a:cs typeface="Times New Roman" panose="02020603050405020304" pitchFamily="18" charset="0"/>
+              </a:rPr>
+              <a:t>text-muted</a:t>
+            </a:r>
+            <a:r>
+              <a:rPr lang="tr-TR" sz="1800" dirty="0">
+                <a:effectLst/>
+                <a:latin typeface="Calibri" panose="020F0502020204030204" pitchFamily="34" charset="0"/>
+                <a:ea typeface="Calibri" panose="020F0502020204030204" pitchFamily="34" charset="0"/>
+                <a:cs typeface="Times New Roman" panose="02020603050405020304" pitchFamily="18" charset="0"/>
+              </a:rPr>
+              <a:t> veya </a:t>
+            </a:r>
+            <a:r>
+              <a:rPr lang="tr-TR" sz="1800" dirty="0" err="1">
+                <a:effectLst/>
+                <a:latin typeface="Calibri" panose="020F0502020204030204" pitchFamily="34" charset="0"/>
+                <a:ea typeface="Calibri" panose="020F0502020204030204" pitchFamily="34" charset="0"/>
+                <a:cs typeface="Times New Roman" panose="02020603050405020304" pitchFamily="18" charset="0"/>
+              </a:rPr>
+              <a:t>text-success</a:t>
+            </a:r>
+            <a:r>
+              <a:rPr lang="tr-TR" sz="1800" dirty="0">
+                <a:effectLst/>
+                <a:latin typeface="Calibri" panose="020F0502020204030204" pitchFamily="34" charset="0"/>
+                <a:ea typeface="Calibri" panose="020F0502020204030204" pitchFamily="34" charset="0"/>
+                <a:cs typeface="Times New Roman" panose="02020603050405020304" pitchFamily="18" charset="0"/>
+              </a:rPr>
+              <a:t> gibi ek renklendirme komutları </a:t>
+            </a:r>
+            <a:r>
+              <a:rPr lang="tr-TR" sz="1800" dirty="0" err="1">
+                <a:effectLst/>
+                <a:latin typeface="Calibri" panose="020F0502020204030204" pitchFamily="34" charset="0"/>
+                <a:ea typeface="Calibri" panose="020F0502020204030204" pitchFamily="34" charset="0"/>
+                <a:cs typeface="Times New Roman" panose="02020603050405020304" pitchFamily="18" charset="0"/>
+              </a:rPr>
+              <a:t>verebilriz</a:t>
+            </a:r>
+            <a:r>
+              <a:rPr lang="tr-TR" sz="1800" dirty="0">
+                <a:effectLst/>
+                <a:latin typeface="Calibri" panose="020F0502020204030204" pitchFamily="34" charset="0"/>
+                <a:ea typeface="Calibri" panose="020F0502020204030204" pitchFamily="34" charset="0"/>
+                <a:cs typeface="Times New Roman" panose="02020603050405020304" pitchFamily="18" charset="0"/>
+              </a:rPr>
+              <a:t>.</a:t>
+            </a:r>
+            <a:br>
+              <a:rPr lang="tr-TR" sz="1800" dirty="0">
+                <a:effectLst/>
+                <a:latin typeface="Calibri" panose="020F0502020204030204" pitchFamily="34" charset="0"/>
+                <a:ea typeface="Calibri" panose="020F0502020204030204" pitchFamily="34" charset="0"/>
+                <a:cs typeface="Times New Roman" panose="02020603050405020304" pitchFamily="18" charset="0"/>
+              </a:rPr>
+            </a:br>
+            <a:br>
+              <a:rPr lang="tr-TR" sz="1800" dirty="0">
+                <a:effectLst/>
+                <a:latin typeface="Calibri" panose="020F0502020204030204" pitchFamily="34" charset="0"/>
+                <a:ea typeface="Calibri" panose="020F0502020204030204" pitchFamily="34" charset="0"/>
+                <a:cs typeface="Times New Roman" panose="02020603050405020304" pitchFamily="18" charset="0"/>
+              </a:rPr>
+            </a:br>
+            <a:r>
+              <a:rPr lang="tr-TR" sz="1800" dirty="0">
+                <a:effectLst/>
+                <a:latin typeface="Calibri" panose="020F0502020204030204" pitchFamily="34" charset="0"/>
+                <a:ea typeface="Calibri" panose="020F0502020204030204" pitchFamily="34" charset="0"/>
+                <a:cs typeface="Times New Roman" panose="02020603050405020304" pitchFamily="18" charset="0"/>
+              </a:rPr>
+              <a:t>örnek kod bloğu:</a:t>
+            </a:r>
+          </a:p>
+          <a:p>
+            <a:pPr>
+              <a:lnSpc>
+                <a:spcPct val="107000"/>
+              </a:lnSpc>
+              <a:spcAft>
+                <a:spcPts val="800"/>
+              </a:spcAft>
+            </a:pPr>
+            <a:r>
+              <a:rPr lang="tr-TR" sz="1800" dirty="0">
+                <a:effectLst/>
+                <a:latin typeface="Calibri" panose="020F0502020204030204" pitchFamily="34" charset="0"/>
+                <a:ea typeface="Calibri" panose="020F0502020204030204" pitchFamily="34" charset="0"/>
+                <a:cs typeface="Times New Roman" panose="02020603050405020304" pitchFamily="18" charset="0"/>
+              </a:rPr>
+              <a:t>&lt;p </a:t>
+            </a:r>
+            <a:r>
+              <a:rPr lang="tr-TR" sz="1800" dirty="0" err="1">
+                <a:effectLst/>
+                <a:latin typeface="Calibri" panose="020F0502020204030204" pitchFamily="34" charset="0"/>
+                <a:ea typeface="Calibri" panose="020F0502020204030204" pitchFamily="34" charset="0"/>
+                <a:cs typeface="Times New Roman" panose="02020603050405020304" pitchFamily="18" charset="0"/>
+              </a:rPr>
+              <a:t>class</a:t>
+            </a:r>
+            <a:r>
+              <a:rPr lang="tr-TR" sz="1800" dirty="0">
+                <a:effectLst/>
+                <a:latin typeface="Calibri" panose="020F0502020204030204" pitchFamily="34" charset="0"/>
+                <a:ea typeface="Calibri" panose="020F0502020204030204" pitchFamily="34" charset="0"/>
+                <a:cs typeface="Times New Roman" panose="02020603050405020304" pitchFamily="18" charset="0"/>
+              </a:rPr>
+              <a:t>="</a:t>
+            </a:r>
+            <a:r>
+              <a:rPr lang="tr-TR" sz="1800" dirty="0" err="1">
+                <a:effectLst/>
+                <a:latin typeface="Calibri" panose="020F0502020204030204" pitchFamily="34" charset="0"/>
+                <a:ea typeface="Calibri" panose="020F0502020204030204" pitchFamily="34" charset="0"/>
+                <a:cs typeface="Times New Roman" panose="02020603050405020304" pitchFamily="18" charset="0"/>
+              </a:rPr>
+              <a:t>text-warning</a:t>
+            </a:r>
+            <a:r>
+              <a:rPr lang="tr-TR" sz="1800" dirty="0">
+                <a:effectLst/>
+                <a:latin typeface="Calibri" panose="020F0502020204030204" pitchFamily="34" charset="0"/>
+                <a:ea typeface="Calibri" panose="020F0502020204030204" pitchFamily="34" charset="0"/>
+                <a:cs typeface="Times New Roman" panose="02020603050405020304" pitchFamily="18" charset="0"/>
+              </a:rPr>
+              <a:t>"&gt;</a:t>
+            </a:r>
+          </a:p>
+          <a:p>
+            <a:pPr>
+              <a:lnSpc>
+                <a:spcPct val="107000"/>
+              </a:lnSpc>
+              <a:spcAft>
+                <a:spcPts val="800"/>
+              </a:spcAft>
+            </a:pPr>
+            <a:r>
+              <a:rPr lang="tr-TR" sz="1800" dirty="0">
+                <a:effectLst/>
+                <a:latin typeface="Calibri" panose="020F0502020204030204" pitchFamily="34" charset="0"/>
+                <a:ea typeface="Calibri" panose="020F0502020204030204" pitchFamily="34" charset="0"/>
+                <a:cs typeface="Times New Roman" panose="02020603050405020304" pitchFamily="18" charset="0"/>
+              </a:rPr>
+              <a:t>            </a:t>
+            </a:r>
+            <a:r>
+              <a:rPr lang="tr-TR" sz="1800" dirty="0" err="1">
+                <a:effectLst/>
+                <a:latin typeface="Calibri" panose="020F0502020204030204" pitchFamily="34" charset="0"/>
+                <a:ea typeface="Calibri" panose="020F0502020204030204" pitchFamily="34" charset="0"/>
+                <a:cs typeface="Times New Roman" panose="02020603050405020304" pitchFamily="18" charset="0"/>
+              </a:rPr>
+              <a:t>Warning</a:t>
+            </a:r>
+            <a:r>
+              <a:rPr lang="tr-TR" sz="1800" dirty="0">
+                <a:effectLst/>
+                <a:latin typeface="Calibri" panose="020F0502020204030204" pitchFamily="34" charset="0"/>
+                <a:ea typeface="Calibri" panose="020F0502020204030204" pitchFamily="34" charset="0"/>
+                <a:cs typeface="Times New Roman" panose="02020603050405020304" pitchFamily="18" charset="0"/>
+              </a:rPr>
+              <a:t> </a:t>
+            </a:r>
+            <a:r>
+              <a:rPr lang="tr-TR" sz="1800" dirty="0" err="1">
+                <a:effectLst/>
+                <a:latin typeface="Calibri" panose="020F0502020204030204" pitchFamily="34" charset="0"/>
+                <a:ea typeface="Calibri" panose="020F0502020204030204" pitchFamily="34" charset="0"/>
+                <a:cs typeface="Times New Roman" panose="02020603050405020304" pitchFamily="18" charset="0"/>
+              </a:rPr>
+              <a:t>text</a:t>
+            </a:r>
+            <a:r>
+              <a:rPr lang="tr-TR" sz="1800" dirty="0">
+                <a:effectLst/>
+                <a:latin typeface="Calibri" panose="020F0502020204030204" pitchFamily="34" charset="0"/>
+                <a:ea typeface="Calibri" panose="020F0502020204030204" pitchFamily="34" charset="0"/>
+                <a:cs typeface="Times New Roman" panose="02020603050405020304" pitchFamily="18" charset="0"/>
+              </a:rPr>
+              <a:t> </a:t>
+            </a:r>
+            <a:r>
+              <a:rPr lang="tr-TR" sz="1800" dirty="0" err="1">
+                <a:effectLst/>
+                <a:latin typeface="Calibri" panose="020F0502020204030204" pitchFamily="34" charset="0"/>
+                <a:ea typeface="Calibri" panose="020F0502020204030204" pitchFamily="34" charset="0"/>
+                <a:cs typeface="Times New Roman" panose="02020603050405020304" pitchFamily="18" charset="0"/>
+              </a:rPr>
+              <a:t>with</a:t>
+            </a:r>
+            <a:r>
+              <a:rPr lang="tr-TR" sz="1800" dirty="0">
+                <a:effectLst/>
+                <a:latin typeface="Calibri" panose="020F0502020204030204" pitchFamily="34" charset="0"/>
+                <a:ea typeface="Calibri" panose="020F0502020204030204" pitchFamily="34" charset="0"/>
+                <a:cs typeface="Times New Roman" panose="02020603050405020304" pitchFamily="18" charset="0"/>
+              </a:rPr>
+              <a:t> a &lt;a </a:t>
+            </a:r>
+            <a:r>
+              <a:rPr lang="tr-TR" sz="1800" dirty="0" err="1">
+                <a:effectLst/>
+                <a:latin typeface="Calibri" panose="020F0502020204030204" pitchFamily="34" charset="0"/>
+                <a:ea typeface="Calibri" panose="020F0502020204030204" pitchFamily="34" charset="0"/>
+                <a:cs typeface="Times New Roman" panose="02020603050405020304" pitchFamily="18" charset="0"/>
+              </a:rPr>
+              <a:t>href</a:t>
+            </a:r>
+            <a:r>
+              <a:rPr lang="tr-TR" sz="1800" dirty="0">
+                <a:effectLst/>
+                <a:latin typeface="Calibri" panose="020F0502020204030204" pitchFamily="34" charset="0"/>
+                <a:ea typeface="Calibri" panose="020F0502020204030204" pitchFamily="34" charset="0"/>
+                <a:cs typeface="Times New Roman" panose="02020603050405020304" pitchFamily="18" charset="0"/>
+              </a:rPr>
+              <a:t>="#" </a:t>
+            </a:r>
+            <a:r>
+              <a:rPr lang="tr-TR" sz="1800" dirty="0" err="1">
+                <a:effectLst/>
+                <a:latin typeface="Calibri" panose="020F0502020204030204" pitchFamily="34" charset="0"/>
+                <a:ea typeface="Calibri" panose="020F0502020204030204" pitchFamily="34" charset="0"/>
+                <a:cs typeface="Times New Roman" panose="02020603050405020304" pitchFamily="18" charset="0"/>
+              </a:rPr>
+              <a:t>class</a:t>
+            </a:r>
+            <a:r>
+              <a:rPr lang="tr-TR" sz="1800" dirty="0">
+                <a:effectLst/>
+                <a:latin typeface="Calibri" panose="020F0502020204030204" pitchFamily="34" charset="0"/>
+                <a:ea typeface="Calibri" panose="020F0502020204030204" pitchFamily="34" charset="0"/>
+                <a:cs typeface="Times New Roman" panose="02020603050405020304" pitchFamily="18" charset="0"/>
+              </a:rPr>
+              <a:t>="</a:t>
+            </a:r>
+            <a:r>
+              <a:rPr lang="tr-TR" sz="1800" dirty="0" err="1">
+                <a:effectLst/>
+                <a:latin typeface="Calibri" panose="020F0502020204030204" pitchFamily="34" charset="0"/>
+                <a:ea typeface="Calibri" panose="020F0502020204030204" pitchFamily="34" charset="0"/>
+                <a:cs typeface="Times New Roman" panose="02020603050405020304" pitchFamily="18" charset="0"/>
+              </a:rPr>
+              <a:t>text-reset</a:t>
+            </a:r>
+            <a:r>
+              <a:rPr lang="tr-TR" sz="1800" dirty="0">
+                <a:effectLst/>
+                <a:latin typeface="Calibri" panose="020F0502020204030204" pitchFamily="34" charset="0"/>
+                <a:ea typeface="Calibri" panose="020F0502020204030204" pitchFamily="34" charset="0"/>
+                <a:cs typeface="Times New Roman" panose="02020603050405020304" pitchFamily="18" charset="0"/>
+              </a:rPr>
+              <a:t>"&gt;</a:t>
+            </a:r>
+            <a:r>
+              <a:rPr lang="tr-TR" sz="1800" dirty="0" err="1">
+                <a:effectLst/>
+                <a:latin typeface="Calibri" panose="020F0502020204030204" pitchFamily="34" charset="0"/>
+                <a:ea typeface="Calibri" panose="020F0502020204030204" pitchFamily="34" charset="0"/>
+                <a:cs typeface="Times New Roman" panose="02020603050405020304" pitchFamily="18" charset="0"/>
+              </a:rPr>
+              <a:t>reset</a:t>
+            </a:r>
+            <a:r>
+              <a:rPr lang="tr-TR" sz="1800" dirty="0">
+                <a:effectLst/>
+                <a:latin typeface="Calibri" panose="020F0502020204030204" pitchFamily="34" charset="0"/>
+                <a:ea typeface="Calibri" panose="020F0502020204030204" pitchFamily="34" charset="0"/>
+                <a:cs typeface="Times New Roman" panose="02020603050405020304" pitchFamily="18" charset="0"/>
+              </a:rPr>
+              <a:t> link&lt;/a&gt;.</a:t>
+            </a:r>
+          </a:p>
+          <a:p>
+            <a:pPr>
+              <a:lnSpc>
+                <a:spcPct val="107000"/>
+              </a:lnSpc>
+              <a:spcAft>
+                <a:spcPts val="800"/>
+              </a:spcAft>
+            </a:pPr>
+            <a:r>
+              <a:rPr lang="tr-TR" sz="1800" dirty="0">
+                <a:effectLst/>
+                <a:latin typeface="Calibri" panose="020F0502020204030204" pitchFamily="34" charset="0"/>
+                <a:ea typeface="Calibri" panose="020F0502020204030204" pitchFamily="34" charset="0"/>
+                <a:cs typeface="Times New Roman" panose="02020603050405020304" pitchFamily="18" charset="0"/>
+              </a:rPr>
+              <a:t>&lt;/p&gt;</a:t>
+            </a:r>
+          </a:p>
+          <a:p>
+            <a:endParaRPr lang="tr-TR" dirty="0"/>
+          </a:p>
+        </p:txBody>
+      </p:sp>
+    </p:spTree>
+    <p:extLst>
+      <p:ext uri="{BB962C8B-B14F-4D97-AF65-F5344CB8AC3E}">
+        <p14:creationId xmlns:p14="http://schemas.microsoft.com/office/powerpoint/2010/main" val="3059896644"/>
+      </p:ext>
+    </p:extLst>
+  </p:cSld>
+  <p:clrMapOvr>
+    <a:masterClrMapping/>
+  </p:clrMapOvr>
+</p:sld>
+</file>
+
+<file path=ppt/slides/slide9.xml><?xml version="1.0" encoding="utf-8"?>
+<p:sld xmlns:a="http://schemas.openxmlformats.org/drawingml/2006/main" xmlns:r="http://schemas.openxmlformats.org/officeDocument/2006/relationships" xmlns:p="http://schemas.openxmlformats.org/presentationml/2006/main">
+  <p:cSld>
+    <p:bg>
+      <p:bgPr>
+        <a:solidFill>
+          <a:schemeClr val="bg1"/>
+        </a:solidFill>
+        <a:effectLst/>
+      </p:bgPr>
+    </p:bg>
+    <p:spTree>
+      <p:nvGrpSpPr>
+        <p:cNvPr id="1" name=""/>
+        <p:cNvGrpSpPr/>
+        <p:nvPr/>
+      </p:nvGrpSpPr>
+      <p:grpSpPr>
+        <a:xfrm>
+          <a:off x="0" y="0"/>
+          <a:ext cx="0" cy="0"/>
+          <a:chOff x="0" y="0"/>
+          <a:chExt cx="0" cy="0"/>
+        </a:xfrm>
+      </p:grpSpPr>
+      <p:sp>
+        <p:nvSpPr>
+          <p:cNvPr id="5" name="Başlık 4">
+            <a:extLst>
+              <a:ext uri="{FF2B5EF4-FFF2-40B4-BE49-F238E27FC236}">
+                <a16:creationId xmlns:a16="http://schemas.microsoft.com/office/drawing/2014/main" id="{8E1A63B1-2AEE-1610-F2F9-D348CF2BC159}"/>
+              </a:ext>
+            </a:extLst>
+          </p:cNvPr>
+          <p:cNvSpPr>
+            <a:spLocks noGrp="1"/>
+          </p:cNvSpPr>
+          <p:nvPr>
+            <p:ph type="title"/>
+          </p:nvPr>
+        </p:nvSpPr>
+        <p:spPr>
+          <a:xfrm>
+            <a:off x="1097280" y="286603"/>
+            <a:ext cx="10058400" cy="1450757"/>
+          </a:xfrm>
+        </p:spPr>
+        <p:txBody>
+          <a:bodyPr>
+            <a:normAutofit/>
+          </a:bodyPr>
+          <a:lstStyle/>
+          <a:p>
+            <a:r>
+              <a:rPr lang="tr-TR" dirty="0"/>
+              <a:t>ASCII </a:t>
+            </a:r>
+            <a:r>
+              <a:rPr lang="tr-TR" dirty="0" err="1"/>
+              <a:t>Vs</a:t>
+            </a:r>
+            <a:r>
+              <a:rPr lang="tr-TR" dirty="0"/>
+              <a:t> UNICODE</a:t>
+            </a:r>
+          </a:p>
+        </p:txBody>
+      </p:sp>
+      <p:sp>
+        <p:nvSpPr>
+          <p:cNvPr id="3" name="İçerik Yer Tutucusu 2">
+            <a:extLst>
+              <a:ext uri="{FF2B5EF4-FFF2-40B4-BE49-F238E27FC236}">
+                <a16:creationId xmlns:a16="http://schemas.microsoft.com/office/drawing/2014/main" id="{41C94E64-C23D-DBAB-066E-0B673E9AB65A}"/>
+              </a:ext>
+            </a:extLst>
+          </p:cNvPr>
+          <p:cNvSpPr>
+            <a:spLocks noGrp="1"/>
+          </p:cNvSpPr>
+          <p:nvPr>
+            <p:ph idx="1"/>
+          </p:nvPr>
+        </p:nvSpPr>
+        <p:spPr>
+          <a:xfrm>
+            <a:off x="1097279" y="1845734"/>
+            <a:ext cx="10058400" cy="4023360"/>
+          </a:xfrm>
+        </p:spPr>
+        <p:txBody>
+          <a:bodyPr>
+            <a:normAutofit fontScale="92500"/>
+          </a:bodyPr>
+          <a:lstStyle/>
+          <a:p>
+            <a:r>
+              <a:rPr lang="tr-TR" sz="2400" dirty="0"/>
+              <a:t>ASCII ve UNICODE en popüler ve dünyada en çok kullanılan karakter tanımlama standartlarıdır. </a:t>
+            </a:r>
+          </a:p>
+          <a:p>
+            <a:r>
+              <a:rPr lang="tr-TR" sz="2400" b="1" u="sng" dirty="0"/>
+              <a:t>ASCII</a:t>
+            </a:r>
+            <a:r>
+              <a:rPr lang="tr-TR" sz="2400" b="1" dirty="0"/>
+              <a:t> </a:t>
+            </a:r>
+            <a:r>
+              <a:rPr lang="tr-TR" sz="2400" dirty="0"/>
+              <a:t>: Elektronik haberleşme için karakter tanımlama(kodlama) için oluşturulan bir standarttır. ASCII her harfin 0 ile 127 sayıları arasında atandığı ve her sayının bir harfi temsil ettiği sistemdir. Örnek verilecek olursa büyük A harfinin sayısal karşılığı 65, büyük B için ise 66 </a:t>
+            </a:r>
+            <a:r>
+              <a:rPr lang="tr-TR" sz="2400" dirty="0" err="1"/>
+              <a:t>dır</a:t>
+            </a:r>
+            <a:r>
+              <a:rPr lang="tr-TR" sz="2400" dirty="0"/>
+              <a:t>. ASCII İngilizce karakterleri tanımlamak için kullanılır.</a:t>
+            </a:r>
+          </a:p>
+          <a:p>
+            <a:r>
+              <a:rPr lang="tr-TR" sz="2400" b="1" u="sng" dirty="0"/>
+              <a:t>UNICODE</a:t>
+            </a:r>
+            <a:r>
+              <a:rPr lang="tr-TR" sz="2400" dirty="0"/>
+              <a:t> : Dünya çapında konuşulan dillerin karakterlerini aynı zamanda </a:t>
+            </a:r>
+            <a:r>
+              <a:rPr lang="tr-TR" sz="2400" dirty="0" err="1"/>
+              <a:t>emojileri</a:t>
+            </a:r>
+            <a:r>
+              <a:rPr lang="tr-TR" sz="2400" dirty="0"/>
+              <a:t> ve başka sembolleri tanımlamak için kullanılır. UNICODE, UTF-8, UTF-16, UTF-32 gibi farklı karakter kodlamalarıyla tanımlanabilir. Günümüz internet sitlerinin yaklaşık %90’ında kullanılan UTF-8, Windows gibi modern işletim sistemlerinde de kullanılır.</a:t>
+            </a:r>
+          </a:p>
+          <a:p>
+            <a:r>
+              <a:rPr lang="tr-TR" sz="1700" dirty="0"/>
+              <a:t> </a:t>
+            </a:r>
+          </a:p>
+        </p:txBody>
+      </p:sp>
+    </p:spTree>
+    <p:extLst>
+      <p:ext uri="{BB962C8B-B14F-4D97-AF65-F5344CB8AC3E}">
+        <p14:creationId xmlns:p14="http://schemas.microsoft.com/office/powerpoint/2010/main" val="3992898264"/>
       </p:ext>
     </p:extLst>
   </p:cSld>

</xml_diff>

<commit_message>
day 4 homework revised - number guessing app
</commit_message>
<xml_diff>
--- a/Homework(research).pptx
+++ b/Homework(research).pptx
@@ -348,7 +348,7 @@
           <a:p>
             <a:fld id="{7453AEDE-A44B-4453-AA99-6868FFC77830}" type="datetimeFigureOut">
               <a:rPr lang="tr-TR" smtClean="0"/>
-              <a:t>31.05.2022</a:t>
+              <a:t>1.06.2022</a:t>
             </a:fld>
             <a:endParaRPr lang="tr-TR"/>
           </a:p>
@@ -556,7 +556,7 @@
           <a:p>
             <a:fld id="{7453AEDE-A44B-4453-AA99-6868FFC77830}" type="datetimeFigureOut">
               <a:rPr lang="tr-TR" smtClean="0"/>
-              <a:t>31.05.2022</a:t>
+              <a:t>1.06.2022</a:t>
             </a:fld>
             <a:endParaRPr lang="tr-TR"/>
           </a:p>
@@ -812,7 +812,7 @@
           <a:p>
             <a:fld id="{7453AEDE-A44B-4453-AA99-6868FFC77830}" type="datetimeFigureOut">
               <a:rPr lang="tr-TR" smtClean="0"/>
-              <a:t>31.05.2022</a:t>
+              <a:t>1.06.2022</a:t>
             </a:fld>
             <a:endParaRPr lang="tr-TR"/>
           </a:p>
@@ -986,7 +986,7 @@
           <a:p>
             <a:fld id="{7453AEDE-A44B-4453-AA99-6868FFC77830}" type="datetimeFigureOut">
               <a:rPr lang="tr-TR" smtClean="0"/>
-              <a:t>31.05.2022</a:t>
+              <a:t>1.06.2022</a:t>
             </a:fld>
             <a:endParaRPr lang="tr-TR"/>
           </a:p>
@@ -1329,7 +1329,7 @@
           <a:p>
             <a:fld id="{7453AEDE-A44B-4453-AA99-6868FFC77830}" type="datetimeFigureOut">
               <a:rPr lang="tr-TR" smtClean="0"/>
-              <a:t>31.05.2022</a:t>
+              <a:t>1.06.2022</a:t>
             </a:fld>
             <a:endParaRPr lang="tr-TR"/>
           </a:p>
@@ -1604,7 +1604,7 @@
           <a:p>
             <a:fld id="{7453AEDE-A44B-4453-AA99-6868FFC77830}" type="datetimeFigureOut">
               <a:rPr lang="tr-TR" smtClean="0"/>
-              <a:t>31.05.2022</a:t>
+              <a:t>1.06.2022</a:t>
             </a:fld>
             <a:endParaRPr lang="tr-TR"/>
           </a:p>
@@ -1983,7 +1983,7 @@
           <a:p>
             <a:fld id="{7453AEDE-A44B-4453-AA99-6868FFC77830}" type="datetimeFigureOut">
               <a:rPr lang="tr-TR" smtClean="0"/>
-              <a:t>31.05.2022</a:t>
+              <a:t>1.06.2022</a:t>
             </a:fld>
             <a:endParaRPr lang="tr-TR"/>
           </a:p>
@@ -2101,7 +2101,7 @@
           <a:p>
             <a:fld id="{7453AEDE-A44B-4453-AA99-6868FFC77830}" type="datetimeFigureOut">
               <a:rPr lang="tr-TR" smtClean="0"/>
-              <a:t>31.05.2022</a:t>
+              <a:t>1.06.2022</a:t>
             </a:fld>
             <a:endParaRPr lang="tr-TR"/>
           </a:p>
@@ -2272,7 +2272,7 @@
           <a:p>
             <a:fld id="{7453AEDE-A44B-4453-AA99-6868FFC77830}" type="datetimeFigureOut">
               <a:rPr lang="tr-TR" smtClean="0"/>
-              <a:t>31.05.2022</a:t>
+              <a:t>1.06.2022</a:t>
             </a:fld>
             <a:endParaRPr lang="tr-TR"/>
           </a:p>
@@ -2626,7 +2626,7 @@
           <a:p>
             <a:fld id="{7453AEDE-A44B-4453-AA99-6868FFC77830}" type="datetimeFigureOut">
               <a:rPr lang="tr-TR" smtClean="0"/>
-              <a:t>31.05.2022</a:t>
+              <a:t>1.06.2022</a:t>
             </a:fld>
             <a:endParaRPr lang="tr-TR"/>
           </a:p>
@@ -3008,7 +3008,7 @@
           <a:p>
             <a:fld id="{7453AEDE-A44B-4453-AA99-6868FFC77830}" type="datetimeFigureOut">
               <a:rPr lang="tr-TR" smtClean="0"/>
-              <a:t>31.05.2022</a:t>
+              <a:t>1.06.2022</a:t>
             </a:fld>
             <a:endParaRPr lang="tr-TR"/>
           </a:p>
@@ -3295,7 +3295,7 @@
           <a:p>
             <a:fld id="{7453AEDE-A44B-4453-AA99-6868FFC77830}" type="datetimeFigureOut">
               <a:rPr lang="tr-TR" smtClean="0"/>
-              <a:t>31.05.2022</a:t>
+              <a:t>1.06.2022</a:t>
             </a:fld>
             <a:endParaRPr lang="tr-TR"/>
           </a:p>
@@ -6956,7 +6956,7 @@
         <p:spPr>
           <a:xfrm>
             <a:off x="4345548" y="1080857"/>
-            <a:ext cx="7492753" cy="4696286"/>
+            <a:ext cx="7492753" cy="5095241"/>
           </a:xfrm>
           <a:prstGeom prst="rect">
             <a:avLst/>
@@ -7378,6 +7378,62 @@
               </a:rPr>
               <a:t>&lt;/p&gt;</a:t>
             </a:r>
+          </a:p>
+          <a:p>
+            <a:pPr>
+              <a:lnSpc>
+                <a:spcPct val="107000"/>
+              </a:lnSpc>
+              <a:spcAft>
+                <a:spcPts val="800"/>
+              </a:spcAft>
+            </a:pPr>
+            <a:r>
+              <a:rPr lang="tr-TR" dirty="0">
+                <a:latin typeface="Calibri" panose="020F0502020204030204" pitchFamily="34" charset="0"/>
+                <a:ea typeface="Calibri" panose="020F0502020204030204" pitchFamily="34" charset="0"/>
+                <a:cs typeface="Times New Roman" panose="02020603050405020304" pitchFamily="18" charset="0"/>
+              </a:rPr>
+              <a:t>Burada a </a:t>
+            </a:r>
+            <a:r>
+              <a:rPr lang="tr-TR" dirty="0" err="1">
+                <a:latin typeface="Calibri" panose="020F0502020204030204" pitchFamily="34" charset="0"/>
+                <a:ea typeface="Calibri" panose="020F0502020204030204" pitchFamily="34" charset="0"/>
+                <a:cs typeface="Times New Roman" panose="02020603050405020304" pitchFamily="18" charset="0"/>
+              </a:rPr>
+              <a:t>tag’ı</a:t>
+            </a:r>
+            <a:r>
+              <a:rPr lang="tr-TR" dirty="0">
+                <a:latin typeface="Calibri" panose="020F0502020204030204" pitchFamily="34" charset="0"/>
+                <a:ea typeface="Calibri" panose="020F0502020204030204" pitchFamily="34" charset="0"/>
+                <a:cs typeface="Times New Roman" panose="02020603050405020304" pitchFamily="18" charset="0"/>
+              </a:rPr>
+              <a:t>, ‘’</a:t>
+            </a:r>
+            <a:r>
+              <a:rPr lang="tr-TR" dirty="0" err="1">
+                <a:latin typeface="Calibri" panose="020F0502020204030204" pitchFamily="34" charset="0"/>
+                <a:ea typeface="Calibri" panose="020F0502020204030204" pitchFamily="34" charset="0"/>
+                <a:cs typeface="Times New Roman" panose="02020603050405020304" pitchFamily="18" charset="0"/>
+              </a:rPr>
+              <a:t>text-warning</a:t>
+            </a:r>
+            <a:r>
+              <a:rPr lang="tr-TR">
+                <a:latin typeface="Calibri" panose="020F0502020204030204" pitchFamily="34" charset="0"/>
+                <a:ea typeface="Calibri" panose="020F0502020204030204" pitchFamily="34" charset="0"/>
+                <a:cs typeface="Times New Roman" panose="02020603050405020304" pitchFamily="18" charset="0"/>
+              </a:rPr>
+              <a:t>’’ rengini alacaktır.</a:t>
+            </a:r>
+            <a:endParaRPr lang="tr-TR" sz="1800" dirty="0">
+              <a:effectLst/>
+              <a:latin typeface="Calibri" panose="020F0502020204030204" pitchFamily="34" charset="0"/>
+              <a:ea typeface="Calibri" panose="020F0502020204030204" pitchFamily="34" charset="0"/>
+              <a:cs typeface="Times New Roman" panose="02020603050405020304" pitchFamily="18" charset="0"/>
+            </a:endParaRPr>
           </a:p>
           <a:p>
             <a:endParaRPr lang="tr-TR" dirty="0"/>

</xml_diff>

<commit_message>
for ve while döngüsü arasındaki farklar
</commit_message>
<xml_diff>
--- a/Homework(research).pptx
+++ b/Homework(research).pptx
@@ -16,6 +16,10 @@
     <p:sldId id="264" r:id="rId10"/>
     <p:sldId id="265" r:id="rId11"/>
     <p:sldId id="266" r:id="rId12"/>
+    <p:sldId id="267" r:id="rId13"/>
+    <p:sldId id="269" r:id="rId14"/>
+    <p:sldId id="271" r:id="rId15"/>
+    <p:sldId id="272" r:id="rId16"/>
   </p:sldIdLst>
   <p:sldSz cx="12192000" cy="6858000"/>
   <p:notesSz cx="6858000" cy="9144000"/>
@@ -348,7 +352,7 @@
           <a:p>
             <a:fld id="{7453AEDE-A44B-4453-AA99-6868FFC77830}" type="datetimeFigureOut">
               <a:rPr lang="tr-TR" smtClean="0"/>
-              <a:t>1.06.2022</a:t>
+              <a:t>8.06.2022</a:t>
             </a:fld>
             <a:endParaRPr lang="tr-TR"/>
           </a:p>
@@ -556,7 +560,7 @@
           <a:p>
             <a:fld id="{7453AEDE-A44B-4453-AA99-6868FFC77830}" type="datetimeFigureOut">
               <a:rPr lang="tr-TR" smtClean="0"/>
-              <a:t>1.06.2022</a:t>
+              <a:t>8.06.2022</a:t>
             </a:fld>
             <a:endParaRPr lang="tr-TR"/>
           </a:p>
@@ -812,7 +816,7 @@
           <a:p>
             <a:fld id="{7453AEDE-A44B-4453-AA99-6868FFC77830}" type="datetimeFigureOut">
               <a:rPr lang="tr-TR" smtClean="0"/>
-              <a:t>1.06.2022</a:t>
+              <a:t>8.06.2022</a:t>
             </a:fld>
             <a:endParaRPr lang="tr-TR"/>
           </a:p>
@@ -986,7 +990,7 @@
           <a:p>
             <a:fld id="{7453AEDE-A44B-4453-AA99-6868FFC77830}" type="datetimeFigureOut">
               <a:rPr lang="tr-TR" smtClean="0"/>
-              <a:t>1.06.2022</a:t>
+              <a:t>8.06.2022</a:t>
             </a:fld>
             <a:endParaRPr lang="tr-TR"/>
           </a:p>
@@ -1329,7 +1333,7 @@
           <a:p>
             <a:fld id="{7453AEDE-A44B-4453-AA99-6868FFC77830}" type="datetimeFigureOut">
               <a:rPr lang="tr-TR" smtClean="0"/>
-              <a:t>1.06.2022</a:t>
+              <a:t>8.06.2022</a:t>
             </a:fld>
             <a:endParaRPr lang="tr-TR"/>
           </a:p>
@@ -1604,7 +1608,7 @@
           <a:p>
             <a:fld id="{7453AEDE-A44B-4453-AA99-6868FFC77830}" type="datetimeFigureOut">
               <a:rPr lang="tr-TR" smtClean="0"/>
-              <a:t>1.06.2022</a:t>
+              <a:t>8.06.2022</a:t>
             </a:fld>
             <a:endParaRPr lang="tr-TR"/>
           </a:p>
@@ -1983,7 +1987,7 @@
           <a:p>
             <a:fld id="{7453AEDE-A44B-4453-AA99-6868FFC77830}" type="datetimeFigureOut">
               <a:rPr lang="tr-TR" smtClean="0"/>
-              <a:t>1.06.2022</a:t>
+              <a:t>8.06.2022</a:t>
             </a:fld>
             <a:endParaRPr lang="tr-TR"/>
           </a:p>
@@ -2101,7 +2105,7 @@
           <a:p>
             <a:fld id="{7453AEDE-A44B-4453-AA99-6868FFC77830}" type="datetimeFigureOut">
               <a:rPr lang="tr-TR" smtClean="0"/>
-              <a:t>1.06.2022</a:t>
+              <a:t>8.06.2022</a:t>
             </a:fld>
             <a:endParaRPr lang="tr-TR"/>
           </a:p>
@@ -2272,7 +2276,7 @@
           <a:p>
             <a:fld id="{7453AEDE-A44B-4453-AA99-6868FFC77830}" type="datetimeFigureOut">
               <a:rPr lang="tr-TR" smtClean="0"/>
-              <a:t>1.06.2022</a:t>
+              <a:t>8.06.2022</a:t>
             </a:fld>
             <a:endParaRPr lang="tr-TR"/>
           </a:p>
@@ -2626,7 +2630,7 @@
           <a:p>
             <a:fld id="{7453AEDE-A44B-4453-AA99-6868FFC77830}" type="datetimeFigureOut">
               <a:rPr lang="tr-TR" smtClean="0"/>
-              <a:t>1.06.2022</a:t>
+              <a:t>8.06.2022</a:t>
             </a:fld>
             <a:endParaRPr lang="tr-TR"/>
           </a:p>
@@ -3008,7 +3012,7 @@
           <a:p>
             <a:fld id="{7453AEDE-A44B-4453-AA99-6868FFC77830}" type="datetimeFigureOut">
               <a:rPr lang="tr-TR" smtClean="0"/>
-              <a:t>1.06.2022</a:t>
+              <a:t>8.06.2022</a:t>
             </a:fld>
             <a:endParaRPr lang="tr-TR"/>
           </a:p>
@@ -3295,7 +3299,7 @@
           <a:p>
             <a:fld id="{7453AEDE-A44B-4453-AA99-6868FFC77830}" type="datetimeFigureOut">
               <a:rPr lang="tr-TR" smtClean="0"/>
-              <a:t>1.06.2022</a:t>
+              <a:t>8.06.2022</a:t>
             </a:fld>
             <a:endParaRPr lang="tr-TR"/>
           </a:p>
@@ -5204,6 +5208,1687 @@
 </p:sld>
 </file>
 
+<file path=ppt/slides/slide12.xml><?xml version="1.0" encoding="utf-8"?>
+<p:sld xmlns:a="http://schemas.openxmlformats.org/drawingml/2006/main" xmlns:r="http://schemas.openxmlformats.org/officeDocument/2006/relationships" xmlns:p="http://schemas.openxmlformats.org/presentationml/2006/main">
+  <p:cSld>
+    <p:bg>
+      <p:bgPr>
+        <a:solidFill>
+          <a:schemeClr val="bg1"/>
+        </a:solidFill>
+        <a:effectLst/>
+      </p:bgPr>
+    </p:bg>
+    <p:spTree>
+      <p:nvGrpSpPr>
+        <p:cNvPr id="1" name=""/>
+        <p:cNvGrpSpPr/>
+        <p:nvPr/>
+      </p:nvGrpSpPr>
+      <p:grpSpPr>
+        <a:xfrm>
+          <a:off x="0" y="0"/>
+          <a:ext cx="0" cy="0"/>
+          <a:chOff x="0" y="0"/>
+          <a:chExt cx="0" cy="0"/>
+        </a:xfrm>
+      </p:grpSpPr>
+      <p:sp useBgFill="1">
+        <p:nvSpPr>
+          <p:cNvPr id="8" name="Rectangle 7">
+            <a:extLst>
+              <a:ext uri="{FF2B5EF4-FFF2-40B4-BE49-F238E27FC236}">
+                <a16:creationId xmlns:a16="http://schemas.microsoft.com/office/drawing/2014/main" id="{3741B58E-3B65-4A01-A276-975AB2CF8A08}"/>
+              </a:ext>
+              <a:ext uri="{C183D7F6-B498-43B3-948B-1728B52AA6E4}">
+                <adec:decorative xmlns:adec="http://schemas.microsoft.com/office/drawing/2017/decorative" val="1"/>
+              </a:ext>
+            </a:extLst>
+          </p:cNvPr>
+          <p:cNvSpPr>
+            <a:spLocks noGrp="1" noRot="1" noChangeAspect="1" noMove="1" noResize="1" noEditPoints="1" noAdjustHandles="1" noChangeArrowheads="1" noChangeShapeType="1" noTextEdit="1"/>
+          </p:cNvSpPr>
+          <p:nvPr>
+            <p:extLst>
+              <p:ext uri="{386F3935-93C4-4BCD-93E2-E3B085C9AB24}">
+                <p16:designElem xmlns:p16="http://schemas.microsoft.com/office/powerpoint/2015/main" val="1"/>
+              </p:ext>
+            </p:extLst>
+          </p:nvPr>
+        </p:nvSpPr>
+        <p:spPr>
+          <a:xfrm>
+            <a:off x="0" y="0"/>
+            <a:ext cx="12186315" cy="6858000"/>
+          </a:xfrm>
+          <a:prstGeom prst="rect">
+            <a:avLst/>
+          </a:prstGeom>
+          <a:ln>
+            <a:noFill/>
+          </a:ln>
+        </p:spPr>
+        <p:style>
+          <a:lnRef idx="2">
+            <a:schemeClr val="accent6">
+              <a:shade val="50000"/>
+            </a:schemeClr>
+          </a:lnRef>
+          <a:fillRef idx="1001">
+            <a:schemeClr val="lt1"/>
+          </a:fillRef>
+          <a:effectRef idx="0">
+            <a:schemeClr val="accent6"/>
+          </a:effectRef>
+          <a:fontRef idx="minor">
+            <a:schemeClr val="lt1"/>
+          </a:fontRef>
+        </p:style>
+        <p:txBody>
+          <a:bodyPr rtlCol="0" anchor="ctr"/>
+          <a:lstStyle/>
+          <a:p>
+            <a:pPr algn="ctr"/>
+            <a:endParaRPr lang="en-US"/>
+          </a:p>
+        </p:txBody>
+      </p:sp>
+      <p:sp>
+        <p:nvSpPr>
+          <p:cNvPr id="10" name="Rectangle 9">
+            <a:extLst>
+              <a:ext uri="{FF2B5EF4-FFF2-40B4-BE49-F238E27FC236}">
+                <a16:creationId xmlns:a16="http://schemas.microsoft.com/office/drawing/2014/main" id="{7AAC67C3-831B-4AB1-A259-DFB839CAFAFC}"/>
+              </a:ext>
+              <a:ext uri="{C183D7F6-B498-43B3-948B-1728B52AA6E4}">
+                <adec:decorative xmlns:adec="http://schemas.microsoft.com/office/drawing/2017/decorative" val="1"/>
+              </a:ext>
+            </a:extLst>
+          </p:cNvPr>
+          <p:cNvSpPr>
+            <a:spLocks noGrp="1" noRot="1" noChangeAspect="1" noMove="1" noResize="1" noEditPoints="1" noAdjustHandles="1" noChangeArrowheads="1" noChangeShapeType="1" noTextEdit="1"/>
+          </p:cNvSpPr>
+          <p:nvPr>
+            <p:extLst>
+              <p:ext uri="{386F3935-93C4-4BCD-93E2-E3B085C9AB24}">
+                <p16:designElem xmlns:p16="http://schemas.microsoft.com/office/powerpoint/2015/main" val="1"/>
+              </p:ext>
+            </p:extLst>
+          </p:nvPr>
+        </p:nvSpPr>
+        <p:spPr>
+          <a:xfrm>
+            <a:off x="16" y="0"/>
+            <a:ext cx="4050791" cy="6858000"/>
+          </a:xfrm>
+          <a:prstGeom prst="rect">
+            <a:avLst/>
+          </a:prstGeom>
+          <a:solidFill>
+            <a:schemeClr val="accent2"/>
+          </a:solidFill>
+          <a:ln>
+            <a:noFill/>
+          </a:ln>
+        </p:spPr>
+        <p:style>
+          <a:lnRef idx="2">
+            <a:schemeClr val="accent1">
+              <a:shade val="50000"/>
+            </a:schemeClr>
+          </a:lnRef>
+          <a:fillRef idx="1">
+            <a:schemeClr val="accent1"/>
+          </a:fillRef>
+          <a:effectRef idx="0">
+            <a:schemeClr val="accent1"/>
+          </a:effectRef>
+          <a:fontRef idx="minor">
+            <a:schemeClr val="lt1"/>
+          </a:fontRef>
+        </p:style>
+      </p:sp>
+      <p:sp>
+        <p:nvSpPr>
+          <p:cNvPr id="2" name="Başlık 1">
+            <a:extLst>
+              <a:ext uri="{FF2B5EF4-FFF2-40B4-BE49-F238E27FC236}">
+                <a16:creationId xmlns:a16="http://schemas.microsoft.com/office/drawing/2014/main" id="{4232ECDD-CA44-1766-8825-2198B1F68C7C}"/>
+              </a:ext>
+            </a:extLst>
+          </p:cNvPr>
+          <p:cNvSpPr>
+            <a:spLocks noGrp="1"/>
+          </p:cNvSpPr>
+          <p:nvPr>
+            <p:ph type="title"/>
+          </p:nvPr>
+        </p:nvSpPr>
+        <p:spPr>
+          <a:xfrm>
+            <a:off x="492370" y="605896"/>
+            <a:ext cx="3084844" cy="5646208"/>
+          </a:xfrm>
+        </p:spPr>
+        <p:txBody>
+          <a:bodyPr anchor="ctr">
+            <a:normAutofit/>
+          </a:bodyPr>
+          <a:lstStyle/>
+          <a:p>
+            <a:r>
+              <a:rPr lang="tr-TR" sz="3600" dirty="0">
+                <a:solidFill>
+                  <a:srgbClr val="FFFFFF"/>
+                </a:solidFill>
+              </a:rPr>
+              <a:t>6. Eğitim Günü Araştırma Ödevi</a:t>
+            </a:r>
+          </a:p>
+        </p:txBody>
+      </p:sp>
+      <p:sp>
+        <p:nvSpPr>
+          <p:cNvPr id="12" name="Rectangle 11">
+            <a:extLst>
+              <a:ext uri="{FF2B5EF4-FFF2-40B4-BE49-F238E27FC236}">
+                <a16:creationId xmlns:a16="http://schemas.microsoft.com/office/drawing/2014/main" id="{054B3F04-9EAC-45C0-B3CE-0387EEA10A0C}"/>
+              </a:ext>
+              <a:ext uri="{C183D7F6-B498-43B3-948B-1728B52AA6E4}">
+                <adec:decorative xmlns:adec="http://schemas.microsoft.com/office/drawing/2017/decorative" val="1"/>
+              </a:ext>
+            </a:extLst>
+          </p:cNvPr>
+          <p:cNvSpPr>
+            <a:spLocks noGrp="1" noRot="1" noChangeAspect="1" noMove="1" noResize="1" noEditPoints="1" noAdjustHandles="1" noChangeArrowheads="1" noChangeShapeType="1" noTextEdit="1"/>
+          </p:cNvSpPr>
+          <p:nvPr>
+            <p:extLst>
+              <p:ext uri="{386F3935-93C4-4BCD-93E2-E3B085C9AB24}">
+                <p16:designElem xmlns:p16="http://schemas.microsoft.com/office/powerpoint/2015/main" val="1"/>
+              </p:ext>
+            </p:extLst>
+          </p:nvPr>
+        </p:nvSpPr>
+        <p:spPr>
+          <a:xfrm>
+            <a:off x="4040071" y="0"/>
+            <a:ext cx="64008" cy="6858000"/>
+          </a:xfrm>
+          <a:prstGeom prst="rect">
+            <a:avLst/>
+          </a:prstGeom>
+          <a:solidFill>
+            <a:schemeClr val="accent1"/>
+          </a:solidFill>
+          <a:ln>
+            <a:noFill/>
+          </a:ln>
+        </p:spPr>
+        <p:style>
+          <a:lnRef idx="2">
+            <a:schemeClr val="accent1">
+              <a:shade val="50000"/>
+            </a:schemeClr>
+          </a:lnRef>
+          <a:fillRef idx="1">
+            <a:schemeClr val="accent1"/>
+          </a:fillRef>
+          <a:effectRef idx="0">
+            <a:schemeClr val="accent1"/>
+          </a:effectRef>
+          <a:fontRef idx="minor">
+            <a:schemeClr val="lt1"/>
+          </a:fontRef>
+        </p:style>
+      </p:sp>
+      <p:sp>
+        <p:nvSpPr>
+          <p:cNvPr id="4" name="Metin kutusu 3">
+            <a:extLst>
+              <a:ext uri="{FF2B5EF4-FFF2-40B4-BE49-F238E27FC236}">
+                <a16:creationId xmlns:a16="http://schemas.microsoft.com/office/drawing/2014/main" id="{546A8742-ED03-19F6-B5A8-A9478B93F691}"/>
+              </a:ext>
+            </a:extLst>
+          </p:cNvPr>
+          <p:cNvSpPr txBox="1"/>
+          <p:nvPr/>
+        </p:nvSpPr>
+        <p:spPr>
+          <a:xfrm>
+            <a:off x="4345548" y="1080857"/>
+            <a:ext cx="7492753" cy="1754326"/>
+          </a:xfrm>
+          <a:prstGeom prst="rect">
+            <a:avLst/>
+          </a:prstGeom>
+          <a:noFill/>
+        </p:spPr>
+        <p:txBody>
+          <a:bodyPr wrap="square" rtlCol="0">
+            <a:spAutoFit/>
+          </a:bodyPr>
+          <a:lstStyle/>
+          <a:p>
+            <a:pPr algn="ctr"/>
+            <a:r>
+              <a:rPr lang="tr-TR" sz="1800" b="1" u="sng" dirty="0" err="1"/>
+              <a:t>For</a:t>
+            </a:r>
+            <a:r>
+              <a:rPr lang="tr-TR" sz="1800" b="1" u="sng" dirty="0"/>
+              <a:t> ve </a:t>
+            </a:r>
+            <a:r>
+              <a:rPr lang="tr-TR" sz="1800" b="1" u="sng" dirty="0" err="1"/>
+              <a:t>While</a:t>
+            </a:r>
+            <a:r>
+              <a:rPr lang="tr-TR" sz="1800" b="1" u="sng" dirty="0"/>
+              <a:t> döngüsü arasındaki farklar.</a:t>
+            </a:r>
+          </a:p>
+          <a:p>
+            <a:pPr algn="ctr"/>
+            <a:endParaRPr lang="tr-TR" b="1" u="sng" dirty="0"/>
+          </a:p>
+          <a:p>
+            <a:pPr algn="l"/>
+            <a:r>
+              <a:rPr lang="tr-TR" sz="1800" b="1" u="sng" dirty="0" err="1">
+                <a:latin typeface="+mn-lt"/>
+              </a:rPr>
+              <a:t>While</a:t>
+            </a:r>
+            <a:r>
+              <a:rPr lang="tr-TR" sz="1800" b="1" u="sng" dirty="0">
+                <a:latin typeface="+mn-lt"/>
+              </a:rPr>
+              <a:t> Döngüsü:</a:t>
+            </a:r>
+          </a:p>
+          <a:p>
+            <a:pPr algn="l"/>
+            <a:r>
+              <a:rPr lang="tr-TR" sz="1800" dirty="0" err="1">
+                <a:latin typeface="+mn-lt"/>
+              </a:rPr>
+              <a:t>While</a:t>
+            </a:r>
+            <a:r>
+              <a:rPr lang="tr-TR" sz="1800" dirty="0">
+                <a:latin typeface="+mn-lt"/>
+              </a:rPr>
+              <a:t> döngüsünde, içerisine yazdığımız koşul sağlanana kadar çalışmaya devam eder. </a:t>
+            </a:r>
+          </a:p>
+          <a:p>
+            <a:endParaRPr lang="tr-TR" dirty="0"/>
+          </a:p>
+        </p:txBody>
+      </p:sp>
+      <p:pic>
+        <p:nvPicPr>
+          <p:cNvPr id="7" name="Resim 6" descr="metin içeren bir resim&#10;&#10;Açıklama otomatik olarak oluşturuldu">
+            <a:extLst>
+              <a:ext uri="{FF2B5EF4-FFF2-40B4-BE49-F238E27FC236}">
+                <a16:creationId xmlns:a16="http://schemas.microsoft.com/office/drawing/2014/main" id="{5496C261-46BB-D49F-47A7-966512051FAB}"/>
+              </a:ext>
+            </a:extLst>
+          </p:cNvPr>
+          <p:cNvPicPr>
+            <a:picLocks noChangeAspect="1"/>
+          </p:cNvPicPr>
+          <p:nvPr/>
+        </p:nvPicPr>
+        <p:blipFill>
+          <a:blip r:embed="rId2">
+            <a:extLst>
+              <a:ext uri="{28A0092B-C50C-407E-A947-70E740481C1C}">
+                <a14:useLocalDpi xmlns:a14="http://schemas.microsoft.com/office/drawing/2010/main" val="0"/>
+              </a:ext>
+            </a:extLst>
+          </a:blip>
+          <a:stretch>
+            <a:fillRect/>
+          </a:stretch>
+        </p:blipFill>
+        <p:spPr>
+          <a:xfrm>
+            <a:off x="4513664" y="2835183"/>
+            <a:ext cx="6576630" cy="3307367"/>
+          </a:xfrm>
+          <a:prstGeom prst="rect">
+            <a:avLst/>
+          </a:prstGeom>
+        </p:spPr>
+      </p:pic>
+    </p:spTree>
+    <p:extLst>
+      <p:ext uri="{BB962C8B-B14F-4D97-AF65-F5344CB8AC3E}">
+        <p14:creationId xmlns:p14="http://schemas.microsoft.com/office/powerpoint/2010/main" val="3333762552"/>
+      </p:ext>
+    </p:extLst>
+  </p:cSld>
+  <p:clrMapOvr>
+    <a:masterClrMapping/>
+  </p:clrMapOvr>
+</p:sld>
+</file>
+
+<file path=ppt/slides/slide13.xml><?xml version="1.0" encoding="utf-8"?>
+<p:sld xmlns:a="http://schemas.openxmlformats.org/drawingml/2006/main" xmlns:r="http://schemas.openxmlformats.org/officeDocument/2006/relationships" xmlns:p="http://schemas.openxmlformats.org/presentationml/2006/main">
+  <p:cSld>
+    <p:bg>
+      <p:bgPr>
+        <a:solidFill>
+          <a:schemeClr val="bg1"/>
+        </a:solidFill>
+        <a:effectLst/>
+      </p:bgPr>
+    </p:bg>
+    <p:spTree>
+      <p:nvGrpSpPr>
+        <p:cNvPr id="1" name=""/>
+        <p:cNvGrpSpPr/>
+        <p:nvPr/>
+      </p:nvGrpSpPr>
+      <p:grpSpPr>
+        <a:xfrm>
+          <a:off x="0" y="0"/>
+          <a:ext cx="0" cy="0"/>
+          <a:chOff x="0" y="0"/>
+          <a:chExt cx="0" cy="0"/>
+        </a:xfrm>
+      </p:grpSpPr>
+      <p:sp>
+        <p:nvSpPr>
+          <p:cNvPr id="5" name="Başlık 4">
+            <a:extLst>
+              <a:ext uri="{FF2B5EF4-FFF2-40B4-BE49-F238E27FC236}">
+                <a16:creationId xmlns:a16="http://schemas.microsoft.com/office/drawing/2014/main" id="{8E1A63B1-2AEE-1610-F2F9-D348CF2BC159}"/>
+              </a:ext>
+            </a:extLst>
+          </p:cNvPr>
+          <p:cNvSpPr>
+            <a:spLocks noGrp="1"/>
+          </p:cNvSpPr>
+          <p:nvPr>
+            <p:ph type="title"/>
+          </p:nvPr>
+        </p:nvSpPr>
+        <p:spPr>
+          <a:xfrm>
+            <a:off x="1097280" y="286603"/>
+            <a:ext cx="10058400" cy="702303"/>
+          </a:xfrm>
+        </p:spPr>
+        <p:txBody>
+          <a:bodyPr>
+            <a:normAutofit fontScale="90000"/>
+          </a:bodyPr>
+          <a:lstStyle/>
+          <a:p>
+            <a:pPr algn="l"/>
+            <a:r>
+              <a:rPr lang="tr-TR" sz="4800" b="1" u="sng" dirty="0" err="1"/>
+              <a:t>For</a:t>
+            </a:r>
+            <a:r>
+              <a:rPr lang="tr-TR" sz="4800" b="1" u="sng" dirty="0"/>
+              <a:t> Döngüsü:</a:t>
+            </a:r>
+          </a:p>
+        </p:txBody>
+      </p:sp>
+      <p:sp>
+        <p:nvSpPr>
+          <p:cNvPr id="4" name="İçerik Yer Tutucusu 2">
+            <a:extLst>
+              <a:ext uri="{FF2B5EF4-FFF2-40B4-BE49-F238E27FC236}">
+                <a16:creationId xmlns:a16="http://schemas.microsoft.com/office/drawing/2014/main" id="{9A010DE7-FDF1-FD4B-8A79-ABB33BFC4B62}"/>
+              </a:ext>
+            </a:extLst>
+          </p:cNvPr>
+          <p:cNvSpPr txBox="1">
+            <a:spLocks/>
+          </p:cNvSpPr>
+          <p:nvPr/>
+        </p:nvSpPr>
+        <p:spPr>
+          <a:xfrm>
+            <a:off x="1097280" y="1154097"/>
+            <a:ext cx="10647877" cy="4714997"/>
+          </a:xfrm>
+          <a:prstGeom prst="rect">
+            <a:avLst/>
+          </a:prstGeom>
+        </p:spPr>
+        <p:txBody>
+          <a:bodyPr vert="horz" lIns="0" tIns="45720" rIns="0" bIns="45720" rtlCol="0">
+            <a:normAutofit/>
+          </a:bodyPr>
+          <a:lstStyle>
+            <a:lvl1pPr marL="91440" indent="-91440" algn="l" defTabSz="914400" rtl="0" eaLnBrk="1" latinLnBrk="0" hangingPunct="1">
+              <a:lnSpc>
+                <a:spcPct val="90000"/>
+              </a:lnSpc>
+              <a:spcBef>
+                <a:spcPts val="1200"/>
+              </a:spcBef>
+              <a:spcAft>
+                <a:spcPts val="200"/>
+              </a:spcAft>
+              <a:buClr>
+                <a:schemeClr val="accent1"/>
+              </a:buClr>
+              <a:buSzPct val="100000"/>
+              <a:buFont typeface="Calibri" panose="020F0502020204030204" pitchFamily="34" charset="0"/>
+              <a:buChar char=" "/>
+              <a:defRPr sz="2000" kern="1200">
+                <a:solidFill>
+                  <a:schemeClr val="tx1">
+                    <a:lumMod val="75000"/>
+                    <a:lumOff val="25000"/>
+                  </a:schemeClr>
+                </a:solidFill>
+                <a:latin typeface="+mn-lt"/>
+                <a:ea typeface="+mn-ea"/>
+                <a:cs typeface="+mn-cs"/>
+              </a:defRPr>
+            </a:lvl1pPr>
+            <a:lvl2pPr marL="384048" indent="-182880" algn="l" defTabSz="914400" rtl="0" eaLnBrk="1" latinLnBrk="0" hangingPunct="1">
+              <a:lnSpc>
+                <a:spcPct val="90000"/>
+              </a:lnSpc>
+              <a:spcBef>
+                <a:spcPts val="200"/>
+              </a:spcBef>
+              <a:spcAft>
+                <a:spcPts val="400"/>
+              </a:spcAft>
+              <a:buClr>
+                <a:schemeClr val="accent1"/>
+              </a:buClr>
+              <a:buFont typeface="Calibri" pitchFamily="34" charset="0"/>
+              <a:buChar char="◦"/>
+              <a:defRPr sz="1800" kern="1200">
+                <a:solidFill>
+                  <a:schemeClr val="tx1">
+                    <a:lumMod val="75000"/>
+                    <a:lumOff val="25000"/>
+                  </a:schemeClr>
+                </a:solidFill>
+                <a:latin typeface="+mn-lt"/>
+                <a:ea typeface="+mn-ea"/>
+                <a:cs typeface="+mn-cs"/>
+              </a:defRPr>
+            </a:lvl2pPr>
+            <a:lvl3pPr marL="566928" indent="-182880" algn="l" defTabSz="914400" rtl="0" eaLnBrk="1" latinLnBrk="0" hangingPunct="1">
+              <a:lnSpc>
+                <a:spcPct val="90000"/>
+              </a:lnSpc>
+              <a:spcBef>
+                <a:spcPts val="200"/>
+              </a:spcBef>
+              <a:spcAft>
+                <a:spcPts val="400"/>
+              </a:spcAft>
+              <a:buClr>
+                <a:schemeClr val="accent1"/>
+              </a:buClr>
+              <a:buFont typeface="Calibri" pitchFamily="34" charset="0"/>
+              <a:buChar char="◦"/>
+              <a:defRPr sz="1400" kern="1200">
+                <a:solidFill>
+                  <a:schemeClr val="tx1">
+                    <a:lumMod val="75000"/>
+                    <a:lumOff val="25000"/>
+                  </a:schemeClr>
+                </a:solidFill>
+                <a:latin typeface="+mn-lt"/>
+                <a:ea typeface="+mn-ea"/>
+                <a:cs typeface="+mn-cs"/>
+              </a:defRPr>
+            </a:lvl3pPr>
+            <a:lvl4pPr marL="749808" indent="-182880" algn="l" defTabSz="914400" rtl="0" eaLnBrk="1" latinLnBrk="0" hangingPunct="1">
+              <a:lnSpc>
+                <a:spcPct val="90000"/>
+              </a:lnSpc>
+              <a:spcBef>
+                <a:spcPts val="200"/>
+              </a:spcBef>
+              <a:spcAft>
+                <a:spcPts val="400"/>
+              </a:spcAft>
+              <a:buClr>
+                <a:schemeClr val="accent1"/>
+              </a:buClr>
+              <a:buFont typeface="Calibri" pitchFamily="34" charset="0"/>
+              <a:buChar char="◦"/>
+              <a:defRPr sz="1400" kern="1200">
+                <a:solidFill>
+                  <a:schemeClr val="tx1">
+                    <a:lumMod val="75000"/>
+                    <a:lumOff val="25000"/>
+                  </a:schemeClr>
+                </a:solidFill>
+                <a:latin typeface="+mn-lt"/>
+                <a:ea typeface="+mn-ea"/>
+                <a:cs typeface="+mn-cs"/>
+              </a:defRPr>
+            </a:lvl4pPr>
+            <a:lvl5pPr marL="932688" indent="-182880" algn="l" defTabSz="914400" rtl="0" eaLnBrk="1" latinLnBrk="0" hangingPunct="1">
+              <a:lnSpc>
+                <a:spcPct val="90000"/>
+              </a:lnSpc>
+              <a:spcBef>
+                <a:spcPts val="200"/>
+              </a:spcBef>
+              <a:spcAft>
+                <a:spcPts val="400"/>
+              </a:spcAft>
+              <a:buClr>
+                <a:schemeClr val="accent1"/>
+              </a:buClr>
+              <a:buFont typeface="Calibri" pitchFamily="34" charset="0"/>
+              <a:buChar char="◦"/>
+              <a:defRPr sz="1400" kern="1200">
+                <a:solidFill>
+                  <a:schemeClr val="tx1">
+                    <a:lumMod val="75000"/>
+                    <a:lumOff val="25000"/>
+                  </a:schemeClr>
+                </a:solidFill>
+                <a:latin typeface="+mn-lt"/>
+                <a:ea typeface="+mn-ea"/>
+                <a:cs typeface="+mn-cs"/>
+              </a:defRPr>
+            </a:lvl5pPr>
+            <a:lvl6pPr marL="1100000" indent="-228600" algn="l" defTabSz="914400" rtl="0" eaLnBrk="1" latinLnBrk="0" hangingPunct="1">
+              <a:lnSpc>
+                <a:spcPct val="90000"/>
+              </a:lnSpc>
+              <a:spcBef>
+                <a:spcPts val="200"/>
+              </a:spcBef>
+              <a:spcAft>
+                <a:spcPts val="400"/>
+              </a:spcAft>
+              <a:buClr>
+                <a:schemeClr val="accent1"/>
+              </a:buClr>
+              <a:buFont typeface="Calibri" pitchFamily="34" charset="0"/>
+              <a:buChar char="◦"/>
+              <a:defRPr sz="1400" kern="1200">
+                <a:solidFill>
+                  <a:schemeClr val="tx1">
+                    <a:lumMod val="75000"/>
+                    <a:lumOff val="25000"/>
+                  </a:schemeClr>
+                </a:solidFill>
+                <a:latin typeface="+mn-lt"/>
+                <a:ea typeface="+mn-ea"/>
+                <a:cs typeface="+mn-cs"/>
+              </a:defRPr>
+            </a:lvl6pPr>
+            <a:lvl7pPr marL="1300000" indent="-228600" algn="l" defTabSz="914400" rtl="0" eaLnBrk="1" latinLnBrk="0" hangingPunct="1">
+              <a:lnSpc>
+                <a:spcPct val="90000"/>
+              </a:lnSpc>
+              <a:spcBef>
+                <a:spcPts val="200"/>
+              </a:spcBef>
+              <a:spcAft>
+                <a:spcPts val="400"/>
+              </a:spcAft>
+              <a:buClr>
+                <a:schemeClr val="accent1"/>
+              </a:buClr>
+              <a:buFont typeface="Calibri" pitchFamily="34" charset="0"/>
+              <a:buChar char="◦"/>
+              <a:defRPr sz="1400" kern="1200">
+                <a:solidFill>
+                  <a:schemeClr val="tx1">
+                    <a:lumMod val="75000"/>
+                    <a:lumOff val="25000"/>
+                  </a:schemeClr>
+                </a:solidFill>
+                <a:latin typeface="+mn-lt"/>
+                <a:ea typeface="+mn-ea"/>
+                <a:cs typeface="+mn-cs"/>
+              </a:defRPr>
+            </a:lvl7pPr>
+            <a:lvl8pPr marL="1500000" indent="-228600" algn="l" defTabSz="914400" rtl="0" eaLnBrk="1" latinLnBrk="0" hangingPunct="1">
+              <a:lnSpc>
+                <a:spcPct val="90000"/>
+              </a:lnSpc>
+              <a:spcBef>
+                <a:spcPts val="200"/>
+              </a:spcBef>
+              <a:spcAft>
+                <a:spcPts val="400"/>
+              </a:spcAft>
+              <a:buClr>
+                <a:schemeClr val="accent1"/>
+              </a:buClr>
+              <a:buFont typeface="Calibri" pitchFamily="34" charset="0"/>
+              <a:buChar char="◦"/>
+              <a:defRPr sz="1400" kern="1200">
+                <a:solidFill>
+                  <a:schemeClr val="tx1">
+                    <a:lumMod val="75000"/>
+                    <a:lumOff val="25000"/>
+                  </a:schemeClr>
+                </a:solidFill>
+                <a:latin typeface="+mn-lt"/>
+                <a:ea typeface="+mn-ea"/>
+                <a:cs typeface="+mn-cs"/>
+              </a:defRPr>
+            </a:lvl8pPr>
+            <a:lvl9pPr marL="1700000" indent="-228600" algn="l" defTabSz="914400" rtl="0" eaLnBrk="1" latinLnBrk="0" hangingPunct="1">
+              <a:lnSpc>
+                <a:spcPct val="90000"/>
+              </a:lnSpc>
+              <a:spcBef>
+                <a:spcPts val="200"/>
+              </a:spcBef>
+              <a:spcAft>
+                <a:spcPts val="400"/>
+              </a:spcAft>
+              <a:buClr>
+                <a:schemeClr val="accent1"/>
+              </a:buClr>
+              <a:buFont typeface="Calibri" pitchFamily="34" charset="0"/>
+              <a:buChar char="◦"/>
+              <a:defRPr sz="1400" kern="1200">
+                <a:solidFill>
+                  <a:schemeClr val="tx1">
+                    <a:lumMod val="75000"/>
+                    <a:lumOff val="25000"/>
+                  </a:schemeClr>
+                </a:solidFill>
+                <a:latin typeface="+mn-lt"/>
+                <a:ea typeface="+mn-ea"/>
+                <a:cs typeface="+mn-cs"/>
+              </a:defRPr>
+            </a:lvl9pPr>
+          </a:lstStyle>
+          <a:p>
+            <a:pPr algn="l"/>
+            <a:r>
+              <a:rPr lang="tr-TR" sz="2400" dirty="0" err="1"/>
+              <a:t>For</a:t>
+            </a:r>
+            <a:r>
+              <a:rPr lang="tr-TR" sz="2400" dirty="0"/>
+              <a:t> döngüsünde ise bir kod bloğu içerisinde istediğimiz kadar çalıştırabiliriz. </a:t>
+            </a:r>
+          </a:p>
+          <a:p>
+            <a:pPr>
+              <a:buFont typeface="Arial" panose="020B0604020202020204" pitchFamily="34" charset="0"/>
+              <a:buChar char="•"/>
+            </a:pPr>
+            <a:endParaRPr lang="tr-TR" sz="1700" dirty="0"/>
+          </a:p>
+        </p:txBody>
+      </p:sp>
+      <p:pic>
+        <p:nvPicPr>
+          <p:cNvPr id="6" name="Resim 5" descr="metin içeren bir resim&#10;&#10;Açıklama otomatik olarak oluşturuldu">
+            <a:extLst>
+              <a:ext uri="{FF2B5EF4-FFF2-40B4-BE49-F238E27FC236}">
+                <a16:creationId xmlns:a16="http://schemas.microsoft.com/office/drawing/2014/main" id="{6B6643E4-0AD8-9C39-1EB2-9A521F492CC9}"/>
+              </a:ext>
+            </a:extLst>
+          </p:cNvPr>
+          <p:cNvPicPr>
+            <a:picLocks noChangeAspect="1"/>
+          </p:cNvPicPr>
+          <p:nvPr/>
+        </p:nvPicPr>
+        <p:blipFill>
+          <a:blip r:embed="rId2">
+            <a:extLst>
+              <a:ext uri="{28A0092B-C50C-407E-A947-70E740481C1C}">
+                <a14:useLocalDpi xmlns:a14="http://schemas.microsoft.com/office/drawing/2010/main" val="0"/>
+              </a:ext>
+            </a:extLst>
+          </a:blip>
+          <a:stretch>
+            <a:fillRect/>
+          </a:stretch>
+        </p:blipFill>
+        <p:spPr>
+          <a:xfrm>
+            <a:off x="3123940" y="1929213"/>
+            <a:ext cx="6005080" cy="3939881"/>
+          </a:xfrm>
+          <a:prstGeom prst="rect">
+            <a:avLst/>
+          </a:prstGeom>
+        </p:spPr>
+      </p:pic>
+    </p:spTree>
+    <p:extLst>
+      <p:ext uri="{BB962C8B-B14F-4D97-AF65-F5344CB8AC3E}">
+        <p14:creationId xmlns:p14="http://schemas.microsoft.com/office/powerpoint/2010/main" val="2700360833"/>
+      </p:ext>
+    </p:extLst>
+  </p:cSld>
+  <p:clrMapOvr>
+    <a:masterClrMapping/>
+  </p:clrMapOvr>
+</p:sld>
+</file>
+
+<file path=ppt/slides/slide14.xml><?xml version="1.0" encoding="utf-8"?>
+<p:sld xmlns:a="http://schemas.openxmlformats.org/drawingml/2006/main" xmlns:r="http://schemas.openxmlformats.org/officeDocument/2006/relationships" xmlns:p="http://schemas.openxmlformats.org/presentationml/2006/main">
+  <p:cSld>
+    <p:bg>
+      <p:bgPr>
+        <a:solidFill>
+          <a:schemeClr val="bg1"/>
+        </a:solidFill>
+        <a:effectLst/>
+      </p:bgPr>
+    </p:bg>
+    <p:spTree>
+      <p:nvGrpSpPr>
+        <p:cNvPr id="1" name=""/>
+        <p:cNvGrpSpPr/>
+        <p:nvPr/>
+      </p:nvGrpSpPr>
+      <p:grpSpPr>
+        <a:xfrm>
+          <a:off x="0" y="0"/>
+          <a:ext cx="0" cy="0"/>
+          <a:chOff x="0" y="0"/>
+          <a:chExt cx="0" cy="0"/>
+        </a:xfrm>
+      </p:grpSpPr>
+      <p:sp>
+        <p:nvSpPr>
+          <p:cNvPr id="5" name="Başlık 4">
+            <a:extLst>
+              <a:ext uri="{FF2B5EF4-FFF2-40B4-BE49-F238E27FC236}">
+                <a16:creationId xmlns:a16="http://schemas.microsoft.com/office/drawing/2014/main" id="{8E1A63B1-2AEE-1610-F2F9-D348CF2BC159}"/>
+              </a:ext>
+            </a:extLst>
+          </p:cNvPr>
+          <p:cNvSpPr>
+            <a:spLocks noGrp="1"/>
+          </p:cNvSpPr>
+          <p:nvPr>
+            <p:ph type="title"/>
+          </p:nvPr>
+        </p:nvSpPr>
+        <p:spPr>
+          <a:xfrm>
+            <a:off x="1097280" y="286603"/>
+            <a:ext cx="10058400" cy="702303"/>
+          </a:xfrm>
+        </p:spPr>
+        <p:txBody>
+          <a:bodyPr>
+            <a:normAutofit fontScale="90000"/>
+          </a:bodyPr>
+          <a:lstStyle/>
+          <a:p>
+            <a:pPr algn="ctr"/>
+            <a:r>
+              <a:rPr lang="tr-TR" sz="4800" b="1" u="sng" dirty="0" err="1"/>
+              <a:t>For</a:t>
+            </a:r>
+            <a:r>
+              <a:rPr lang="tr-TR" sz="4800" b="1" u="sng" dirty="0"/>
+              <a:t> ve </a:t>
+            </a:r>
+            <a:r>
+              <a:rPr lang="tr-TR" sz="4800" b="1" u="sng" dirty="0" err="1"/>
+              <a:t>While</a:t>
+            </a:r>
+            <a:r>
+              <a:rPr lang="tr-TR" sz="4800" b="1" u="sng" dirty="0"/>
+              <a:t> döngüsü arasındaki farklar.</a:t>
+            </a:r>
+            <a:endParaRPr lang="tr-TR" dirty="0"/>
+          </a:p>
+        </p:txBody>
+      </p:sp>
+      <p:sp>
+        <p:nvSpPr>
+          <p:cNvPr id="4" name="İçerik Yer Tutucusu 2">
+            <a:extLst>
+              <a:ext uri="{FF2B5EF4-FFF2-40B4-BE49-F238E27FC236}">
+                <a16:creationId xmlns:a16="http://schemas.microsoft.com/office/drawing/2014/main" id="{9A010DE7-FDF1-FD4B-8A79-ABB33BFC4B62}"/>
+              </a:ext>
+            </a:extLst>
+          </p:cNvPr>
+          <p:cNvSpPr txBox="1">
+            <a:spLocks/>
+          </p:cNvSpPr>
+          <p:nvPr/>
+        </p:nvSpPr>
+        <p:spPr>
+          <a:xfrm>
+            <a:off x="772061" y="1180730"/>
+            <a:ext cx="10647877" cy="4928061"/>
+          </a:xfrm>
+          <a:prstGeom prst="rect">
+            <a:avLst/>
+          </a:prstGeom>
+        </p:spPr>
+        <p:txBody>
+          <a:bodyPr vert="horz" lIns="0" tIns="45720" rIns="0" bIns="45720" rtlCol="0">
+            <a:normAutofit fontScale="92500" lnSpcReduction="10000"/>
+          </a:bodyPr>
+          <a:lstStyle>
+            <a:lvl1pPr marL="91440" indent="-91440" algn="l" defTabSz="914400" rtl="0" eaLnBrk="1" latinLnBrk="0" hangingPunct="1">
+              <a:lnSpc>
+                <a:spcPct val="90000"/>
+              </a:lnSpc>
+              <a:spcBef>
+                <a:spcPts val="1200"/>
+              </a:spcBef>
+              <a:spcAft>
+                <a:spcPts val="200"/>
+              </a:spcAft>
+              <a:buClr>
+                <a:schemeClr val="accent1"/>
+              </a:buClr>
+              <a:buSzPct val="100000"/>
+              <a:buFont typeface="Calibri" panose="020F0502020204030204" pitchFamily="34" charset="0"/>
+              <a:buChar char=" "/>
+              <a:defRPr sz="2000" kern="1200">
+                <a:solidFill>
+                  <a:schemeClr val="tx1">
+                    <a:lumMod val="75000"/>
+                    <a:lumOff val="25000"/>
+                  </a:schemeClr>
+                </a:solidFill>
+                <a:latin typeface="+mn-lt"/>
+                <a:ea typeface="+mn-ea"/>
+                <a:cs typeface="+mn-cs"/>
+              </a:defRPr>
+            </a:lvl1pPr>
+            <a:lvl2pPr marL="384048" indent="-182880" algn="l" defTabSz="914400" rtl="0" eaLnBrk="1" latinLnBrk="0" hangingPunct="1">
+              <a:lnSpc>
+                <a:spcPct val="90000"/>
+              </a:lnSpc>
+              <a:spcBef>
+                <a:spcPts val="200"/>
+              </a:spcBef>
+              <a:spcAft>
+                <a:spcPts val="400"/>
+              </a:spcAft>
+              <a:buClr>
+                <a:schemeClr val="accent1"/>
+              </a:buClr>
+              <a:buFont typeface="Calibri" pitchFamily="34" charset="0"/>
+              <a:buChar char="◦"/>
+              <a:defRPr sz="1800" kern="1200">
+                <a:solidFill>
+                  <a:schemeClr val="tx1">
+                    <a:lumMod val="75000"/>
+                    <a:lumOff val="25000"/>
+                  </a:schemeClr>
+                </a:solidFill>
+                <a:latin typeface="+mn-lt"/>
+                <a:ea typeface="+mn-ea"/>
+                <a:cs typeface="+mn-cs"/>
+              </a:defRPr>
+            </a:lvl2pPr>
+            <a:lvl3pPr marL="566928" indent="-182880" algn="l" defTabSz="914400" rtl="0" eaLnBrk="1" latinLnBrk="0" hangingPunct="1">
+              <a:lnSpc>
+                <a:spcPct val="90000"/>
+              </a:lnSpc>
+              <a:spcBef>
+                <a:spcPts val="200"/>
+              </a:spcBef>
+              <a:spcAft>
+                <a:spcPts val="400"/>
+              </a:spcAft>
+              <a:buClr>
+                <a:schemeClr val="accent1"/>
+              </a:buClr>
+              <a:buFont typeface="Calibri" pitchFamily="34" charset="0"/>
+              <a:buChar char="◦"/>
+              <a:defRPr sz="1400" kern="1200">
+                <a:solidFill>
+                  <a:schemeClr val="tx1">
+                    <a:lumMod val="75000"/>
+                    <a:lumOff val="25000"/>
+                  </a:schemeClr>
+                </a:solidFill>
+                <a:latin typeface="+mn-lt"/>
+                <a:ea typeface="+mn-ea"/>
+                <a:cs typeface="+mn-cs"/>
+              </a:defRPr>
+            </a:lvl3pPr>
+            <a:lvl4pPr marL="749808" indent="-182880" algn="l" defTabSz="914400" rtl="0" eaLnBrk="1" latinLnBrk="0" hangingPunct="1">
+              <a:lnSpc>
+                <a:spcPct val="90000"/>
+              </a:lnSpc>
+              <a:spcBef>
+                <a:spcPts val="200"/>
+              </a:spcBef>
+              <a:spcAft>
+                <a:spcPts val="400"/>
+              </a:spcAft>
+              <a:buClr>
+                <a:schemeClr val="accent1"/>
+              </a:buClr>
+              <a:buFont typeface="Calibri" pitchFamily="34" charset="0"/>
+              <a:buChar char="◦"/>
+              <a:defRPr sz="1400" kern="1200">
+                <a:solidFill>
+                  <a:schemeClr val="tx1">
+                    <a:lumMod val="75000"/>
+                    <a:lumOff val="25000"/>
+                  </a:schemeClr>
+                </a:solidFill>
+                <a:latin typeface="+mn-lt"/>
+                <a:ea typeface="+mn-ea"/>
+                <a:cs typeface="+mn-cs"/>
+              </a:defRPr>
+            </a:lvl4pPr>
+            <a:lvl5pPr marL="932688" indent="-182880" algn="l" defTabSz="914400" rtl="0" eaLnBrk="1" latinLnBrk="0" hangingPunct="1">
+              <a:lnSpc>
+                <a:spcPct val="90000"/>
+              </a:lnSpc>
+              <a:spcBef>
+                <a:spcPts val="200"/>
+              </a:spcBef>
+              <a:spcAft>
+                <a:spcPts val="400"/>
+              </a:spcAft>
+              <a:buClr>
+                <a:schemeClr val="accent1"/>
+              </a:buClr>
+              <a:buFont typeface="Calibri" pitchFamily="34" charset="0"/>
+              <a:buChar char="◦"/>
+              <a:defRPr sz="1400" kern="1200">
+                <a:solidFill>
+                  <a:schemeClr val="tx1">
+                    <a:lumMod val="75000"/>
+                    <a:lumOff val="25000"/>
+                  </a:schemeClr>
+                </a:solidFill>
+                <a:latin typeface="+mn-lt"/>
+                <a:ea typeface="+mn-ea"/>
+                <a:cs typeface="+mn-cs"/>
+              </a:defRPr>
+            </a:lvl5pPr>
+            <a:lvl6pPr marL="1100000" indent="-228600" algn="l" defTabSz="914400" rtl="0" eaLnBrk="1" latinLnBrk="0" hangingPunct="1">
+              <a:lnSpc>
+                <a:spcPct val="90000"/>
+              </a:lnSpc>
+              <a:spcBef>
+                <a:spcPts val="200"/>
+              </a:spcBef>
+              <a:spcAft>
+                <a:spcPts val="400"/>
+              </a:spcAft>
+              <a:buClr>
+                <a:schemeClr val="accent1"/>
+              </a:buClr>
+              <a:buFont typeface="Calibri" pitchFamily="34" charset="0"/>
+              <a:buChar char="◦"/>
+              <a:defRPr sz="1400" kern="1200">
+                <a:solidFill>
+                  <a:schemeClr val="tx1">
+                    <a:lumMod val="75000"/>
+                    <a:lumOff val="25000"/>
+                  </a:schemeClr>
+                </a:solidFill>
+                <a:latin typeface="+mn-lt"/>
+                <a:ea typeface="+mn-ea"/>
+                <a:cs typeface="+mn-cs"/>
+              </a:defRPr>
+            </a:lvl6pPr>
+            <a:lvl7pPr marL="1300000" indent="-228600" algn="l" defTabSz="914400" rtl="0" eaLnBrk="1" latinLnBrk="0" hangingPunct="1">
+              <a:lnSpc>
+                <a:spcPct val="90000"/>
+              </a:lnSpc>
+              <a:spcBef>
+                <a:spcPts val="200"/>
+              </a:spcBef>
+              <a:spcAft>
+                <a:spcPts val="400"/>
+              </a:spcAft>
+              <a:buClr>
+                <a:schemeClr val="accent1"/>
+              </a:buClr>
+              <a:buFont typeface="Calibri" pitchFamily="34" charset="0"/>
+              <a:buChar char="◦"/>
+              <a:defRPr sz="1400" kern="1200">
+                <a:solidFill>
+                  <a:schemeClr val="tx1">
+                    <a:lumMod val="75000"/>
+                    <a:lumOff val="25000"/>
+                  </a:schemeClr>
+                </a:solidFill>
+                <a:latin typeface="+mn-lt"/>
+                <a:ea typeface="+mn-ea"/>
+                <a:cs typeface="+mn-cs"/>
+              </a:defRPr>
+            </a:lvl7pPr>
+            <a:lvl8pPr marL="1500000" indent="-228600" algn="l" defTabSz="914400" rtl="0" eaLnBrk="1" latinLnBrk="0" hangingPunct="1">
+              <a:lnSpc>
+                <a:spcPct val="90000"/>
+              </a:lnSpc>
+              <a:spcBef>
+                <a:spcPts val="200"/>
+              </a:spcBef>
+              <a:spcAft>
+                <a:spcPts val="400"/>
+              </a:spcAft>
+              <a:buClr>
+                <a:schemeClr val="accent1"/>
+              </a:buClr>
+              <a:buFont typeface="Calibri" pitchFamily="34" charset="0"/>
+              <a:buChar char="◦"/>
+              <a:defRPr sz="1400" kern="1200">
+                <a:solidFill>
+                  <a:schemeClr val="tx1">
+                    <a:lumMod val="75000"/>
+                    <a:lumOff val="25000"/>
+                  </a:schemeClr>
+                </a:solidFill>
+                <a:latin typeface="+mn-lt"/>
+                <a:ea typeface="+mn-ea"/>
+                <a:cs typeface="+mn-cs"/>
+              </a:defRPr>
+            </a:lvl8pPr>
+            <a:lvl9pPr marL="1700000" indent="-228600" algn="l" defTabSz="914400" rtl="0" eaLnBrk="1" latinLnBrk="0" hangingPunct="1">
+              <a:lnSpc>
+                <a:spcPct val="90000"/>
+              </a:lnSpc>
+              <a:spcBef>
+                <a:spcPts val="200"/>
+              </a:spcBef>
+              <a:spcAft>
+                <a:spcPts val="400"/>
+              </a:spcAft>
+              <a:buClr>
+                <a:schemeClr val="accent1"/>
+              </a:buClr>
+              <a:buFont typeface="Calibri" pitchFamily="34" charset="0"/>
+              <a:buChar char="◦"/>
+              <a:defRPr sz="1400" kern="1200">
+                <a:solidFill>
+                  <a:schemeClr val="tx1">
+                    <a:lumMod val="75000"/>
+                    <a:lumOff val="25000"/>
+                  </a:schemeClr>
+                </a:solidFill>
+                <a:latin typeface="+mn-lt"/>
+                <a:ea typeface="+mn-ea"/>
+                <a:cs typeface="+mn-cs"/>
+              </a:defRPr>
+            </a:lvl9pPr>
+          </a:lstStyle>
+          <a:p>
+            <a:pPr algn="ctr"/>
+            <a:r>
+              <a:rPr lang="tr-TR" sz="2400" b="1" u="sng" dirty="0" err="1"/>
+              <a:t>Iki</a:t>
+            </a:r>
+            <a:r>
+              <a:rPr lang="tr-TR" sz="2400" b="1" u="sng" dirty="0"/>
+              <a:t> döngü arasındaki farklar</a:t>
+            </a:r>
+          </a:p>
+          <a:p>
+            <a:pPr algn="ctr"/>
+            <a:endParaRPr lang="tr-TR" sz="2400" b="1" u="sng" dirty="0"/>
+          </a:p>
+          <a:p>
+            <a:pPr algn="just"/>
+            <a:r>
+              <a:rPr lang="tr-TR" sz="2400" dirty="0"/>
+              <a:t>En temel farklardan biri ise  </a:t>
+            </a:r>
+            <a:r>
+              <a:rPr lang="tr-TR" sz="2400" dirty="0" err="1"/>
+              <a:t>for</a:t>
+            </a:r>
+            <a:r>
+              <a:rPr lang="tr-TR" sz="2400" dirty="0"/>
+              <a:t> döngüsünde ‘’</a:t>
+            </a:r>
+            <a:r>
+              <a:rPr lang="tr-TR" sz="2400" dirty="0" err="1"/>
+              <a:t>iterative</a:t>
+            </a:r>
+            <a:r>
+              <a:rPr lang="tr-TR" sz="2400" dirty="0"/>
+              <a:t>’’ yani tekrarlayan bir yapıdır. </a:t>
+            </a:r>
+            <a:r>
+              <a:rPr lang="tr-TR" sz="2400" dirty="0" err="1"/>
+              <a:t>While</a:t>
+            </a:r>
+            <a:r>
+              <a:rPr lang="tr-TR" sz="2400" dirty="0"/>
+              <a:t> ise bir koşulumuz sağlanana kadar devam etmesini istediğimiz durumlarda kullanırız. </a:t>
+            </a:r>
+          </a:p>
+          <a:p>
+            <a:pPr algn="just"/>
+            <a:endParaRPr lang="tr-TR" sz="2400" dirty="0"/>
+          </a:p>
+          <a:p>
+            <a:pPr algn="just"/>
+            <a:r>
+              <a:rPr lang="tr-TR" sz="2400" dirty="0"/>
+              <a:t>Örneğin, kullanıcıdan aldığımız bir sayının içerisinde ne kadar asal sayı olduğunu bulmak istiyorsak burada </a:t>
+            </a:r>
+            <a:r>
+              <a:rPr lang="tr-TR" sz="2400" b="1" u="sng" dirty="0" err="1"/>
+              <a:t>for</a:t>
+            </a:r>
+            <a:r>
+              <a:rPr lang="tr-TR" sz="2400" u="sng" dirty="0"/>
+              <a:t> </a:t>
+            </a:r>
+            <a:r>
+              <a:rPr lang="tr-TR" sz="2400" dirty="0"/>
+              <a:t>döngüsünü kullanmamız daha yerinde olacaktır. </a:t>
+            </a:r>
+          </a:p>
+          <a:p>
+            <a:pPr algn="just"/>
+            <a:r>
+              <a:rPr lang="tr-TR" sz="2400" dirty="0"/>
+              <a:t>Ancak bir işlemi doğrulamak istediğimizi varsayalım. Sitemizde bulunan mail yollama bölümünden kullanıcının bizimle iletişime geçmesine olanak verelim. Ancak bu iletişim sistemini </a:t>
+            </a:r>
+            <a:r>
+              <a:rPr lang="tr-TR" sz="2400" dirty="0" err="1"/>
+              <a:t>spamdan</a:t>
+            </a:r>
+            <a:r>
+              <a:rPr lang="tr-TR" sz="2400" dirty="0"/>
+              <a:t> korumak için basit bir toplama işlemi araya koyalım. Kullanıcı bu işlemin sonucunu doğru girdiğinde mail yollayabilsin, bu işlemin sonucunu yanlış girdiğinde ise farklı bir toplama işlemi karşısına çıkartarak tekrar hesaplamasını isteyelim. Bu durum da ise </a:t>
+            </a:r>
+            <a:r>
+              <a:rPr lang="tr-TR" sz="2400" b="1" u="sng" dirty="0" err="1"/>
+              <a:t>while</a:t>
+            </a:r>
+            <a:r>
+              <a:rPr lang="tr-TR" sz="2400" b="1" u="sng" dirty="0"/>
+              <a:t> </a:t>
+            </a:r>
+            <a:r>
+              <a:rPr lang="tr-TR" sz="2400" dirty="0"/>
+              <a:t>döngüsünü kullanmamız daha doğru olacaktır.</a:t>
+            </a:r>
+          </a:p>
+          <a:p>
+            <a:pPr algn="l"/>
+            <a:endParaRPr lang="tr-TR" sz="2400" dirty="0"/>
+          </a:p>
+        </p:txBody>
+      </p:sp>
+    </p:spTree>
+    <p:extLst>
+      <p:ext uri="{BB962C8B-B14F-4D97-AF65-F5344CB8AC3E}">
+        <p14:creationId xmlns:p14="http://schemas.microsoft.com/office/powerpoint/2010/main" val="2030950516"/>
+      </p:ext>
+    </p:extLst>
+  </p:cSld>
+  <p:clrMapOvr>
+    <a:masterClrMapping/>
+  </p:clrMapOvr>
+</p:sld>
+</file>
+
+<file path=ppt/slides/slide15.xml><?xml version="1.0" encoding="utf-8"?>
+<p:sld xmlns:a="http://schemas.openxmlformats.org/drawingml/2006/main" xmlns:r="http://schemas.openxmlformats.org/officeDocument/2006/relationships" xmlns:p="http://schemas.openxmlformats.org/presentationml/2006/main">
+  <p:cSld>
+    <p:bg>
+      <p:bgPr>
+        <a:solidFill>
+          <a:schemeClr val="bg1"/>
+        </a:solidFill>
+        <a:effectLst/>
+      </p:bgPr>
+    </p:bg>
+    <p:spTree>
+      <p:nvGrpSpPr>
+        <p:cNvPr id="1" name=""/>
+        <p:cNvGrpSpPr/>
+        <p:nvPr/>
+      </p:nvGrpSpPr>
+      <p:grpSpPr>
+        <a:xfrm>
+          <a:off x="0" y="0"/>
+          <a:ext cx="0" cy="0"/>
+          <a:chOff x="0" y="0"/>
+          <a:chExt cx="0" cy="0"/>
+        </a:xfrm>
+      </p:grpSpPr>
+      <p:sp>
+        <p:nvSpPr>
+          <p:cNvPr id="5" name="Başlık 4">
+            <a:extLst>
+              <a:ext uri="{FF2B5EF4-FFF2-40B4-BE49-F238E27FC236}">
+                <a16:creationId xmlns:a16="http://schemas.microsoft.com/office/drawing/2014/main" id="{8E1A63B1-2AEE-1610-F2F9-D348CF2BC159}"/>
+              </a:ext>
+            </a:extLst>
+          </p:cNvPr>
+          <p:cNvSpPr>
+            <a:spLocks noGrp="1"/>
+          </p:cNvSpPr>
+          <p:nvPr>
+            <p:ph type="title"/>
+          </p:nvPr>
+        </p:nvSpPr>
+        <p:spPr>
+          <a:xfrm>
+            <a:off x="1097280" y="286603"/>
+            <a:ext cx="10058400" cy="702303"/>
+          </a:xfrm>
+        </p:spPr>
+        <p:txBody>
+          <a:bodyPr>
+            <a:normAutofit fontScale="90000"/>
+          </a:bodyPr>
+          <a:lstStyle/>
+          <a:p>
+            <a:pPr algn="ctr"/>
+            <a:r>
+              <a:rPr lang="tr-TR" sz="4800" b="1" u="sng" dirty="0" err="1"/>
+              <a:t>For</a:t>
+            </a:r>
+            <a:r>
+              <a:rPr lang="tr-TR" sz="4800" b="1" u="sng" dirty="0"/>
+              <a:t> ve </a:t>
+            </a:r>
+            <a:r>
+              <a:rPr lang="tr-TR" sz="4800" b="1" u="sng" dirty="0" err="1"/>
+              <a:t>While</a:t>
+            </a:r>
+            <a:r>
+              <a:rPr lang="tr-TR" sz="4800" b="1" u="sng" dirty="0"/>
+              <a:t> döngüsü arasındaki farklar.</a:t>
+            </a:r>
+            <a:endParaRPr lang="tr-TR" dirty="0"/>
+          </a:p>
+        </p:txBody>
+      </p:sp>
+      <p:sp>
+        <p:nvSpPr>
+          <p:cNvPr id="4" name="İçerik Yer Tutucusu 2">
+            <a:extLst>
+              <a:ext uri="{FF2B5EF4-FFF2-40B4-BE49-F238E27FC236}">
+                <a16:creationId xmlns:a16="http://schemas.microsoft.com/office/drawing/2014/main" id="{9A010DE7-FDF1-FD4B-8A79-ABB33BFC4B62}"/>
+              </a:ext>
+            </a:extLst>
+          </p:cNvPr>
+          <p:cNvSpPr txBox="1">
+            <a:spLocks/>
+          </p:cNvSpPr>
+          <p:nvPr/>
+        </p:nvSpPr>
+        <p:spPr>
+          <a:xfrm>
+            <a:off x="772061" y="1180730"/>
+            <a:ext cx="10647877" cy="4928061"/>
+          </a:xfrm>
+          <a:prstGeom prst="rect">
+            <a:avLst/>
+          </a:prstGeom>
+        </p:spPr>
+        <p:txBody>
+          <a:bodyPr vert="horz" lIns="0" tIns="45720" rIns="0" bIns="45720" rtlCol="0">
+            <a:normAutofit/>
+          </a:bodyPr>
+          <a:lstStyle>
+            <a:lvl1pPr marL="91440" indent="-91440" algn="l" defTabSz="914400" rtl="0" eaLnBrk="1" latinLnBrk="0" hangingPunct="1">
+              <a:lnSpc>
+                <a:spcPct val="90000"/>
+              </a:lnSpc>
+              <a:spcBef>
+                <a:spcPts val="1200"/>
+              </a:spcBef>
+              <a:spcAft>
+                <a:spcPts val="200"/>
+              </a:spcAft>
+              <a:buClr>
+                <a:schemeClr val="accent1"/>
+              </a:buClr>
+              <a:buSzPct val="100000"/>
+              <a:buFont typeface="Calibri" panose="020F0502020204030204" pitchFamily="34" charset="0"/>
+              <a:buChar char=" "/>
+              <a:defRPr sz="2000" kern="1200">
+                <a:solidFill>
+                  <a:schemeClr val="tx1">
+                    <a:lumMod val="75000"/>
+                    <a:lumOff val="25000"/>
+                  </a:schemeClr>
+                </a:solidFill>
+                <a:latin typeface="+mn-lt"/>
+                <a:ea typeface="+mn-ea"/>
+                <a:cs typeface="+mn-cs"/>
+              </a:defRPr>
+            </a:lvl1pPr>
+            <a:lvl2pPr marL="384048" indent="-182880" algn="l" defTabSz="914400" rtl="0" eaLnBrk="1" latinLnBrk="0" hangingPunct="1">
+              <a:lnSpc>
+                <a:spcPct val="90000"/>
+              </a:lnSpc>
+              <a:spcBef>
+                <a:spcPts val="200"/>
+              </a:spcBef>
+              <a:spcAft>
+                <a:spcPts val="400"/>
+              </a:spcAft>
+              <a:buClr>
+                <a:schemeClr val="accent1"/>
+              </a:buClr>
+              <a:buFont typeface="Calibri" pitchFamily="34" charset="0"/>
+              <a:buChar char="◦"/>
+              <a:defRPr sz="1800" kern="1200">
+                <a:solidFill>
+                  <a:schemeClr val="tx1">
+                    <a:lumMod val="75000"/>
+                    <a:lumOff val="25000"/>
+                  </a:schemeClr>
+                </a:solidFill>
+                <a:latin typeface="+mn-lt"/>
+                <a:ea typeface="+mn-ea"/>
+                <a:cs typeface="+mn-cs"/>
+              </a:defRPr>
+            </a:lvl2pPr>
+            <a:lvl3pPr marL="566928" indent="-182880" algn="l" defTabSz="914400" rtl="0" eaLnBrk="1" latinLnBrk="0" hangingPunct="1">
+              <a:lnSpc>
+                <a:spcPct val="90000"/>
+              </a:lnSpc>
+              <a:spcBef>
+                <a:spcPts val="200"/>
+              </a:spcBef>
+              <a:spcAft>
+                <a:spcPts val="400"/>
+              </a:spcAft>
+              <a:buClr>
+                <a:schemeClr val="accent1"/>
+              </a:buClr>
+              <a:buFont typeface="Calibri" pitchFamily="34" charset="0"/>
+              <a:buChar char="◦"/>
+              <a:defRPr sz="1400" kern="1200">
+                <a:solidFill>
+                  <a:schemeClr val="tx1">
+                    <a:lumMod val="75000"/>
+                    <a:lumOff val="25000"/>
+                  </a:schemeClr>
+                </a:solidFill>
+                <a:latin typeface="+mn-lt"/>
+                <a:ea typeface="+mn-ea"/>
+                <a:cs typeface="+mn-cs"/>
+              </a:defRPr>
+            </a:lvl3pPr>
+            <a:lvl4pPr marL="749808" indent="-182880" algn="l" defTabSz="914400" rtl="0" eaLnBrk="1" latinLnBrk="0" hangingPunct="1">
+              <a:lnSpc>
+                <a:spcPct val="90000"/>
+              </a:lnSpc>
+              <a:spcBef>
+                <a:spcPts val="200"/>
+              </a:spcBef>
+              <a:spcAft>
+                <a:spcPts val="400"/>
+              </a:spcAft>
+              <a:buClr>
+                <a:schemeClr val="accent1"/>
+              </a:buClr>
+              <a:buFont typeface="Calibri" pitchFamily="34" charset="0"/>
+              <a:buChar char="◦"/>
+              <a:defRPr sz="1400" kern="1200">
+                <a:solidFill>
+                  <a:schemeClr val="tx1">
+                    <a:lumMod val="75000"/>
+                    <a:lumOff val="25000"/>
+                  </a:schemeClr>
+                </a:solidFill>
+                <a:latin typeface="+mn-lt"/>
+                <a:ea typeface="+mn-ea"/>
+                <a:cs typeface="+mn-cs"/>
+              </a:defRPr>
+            </a:lvl4pPr>
+            <a:lvl5pPr marL="932688" indent="-182880" algn="l" defTabSz="914400" rtl="0" eaLnBrk="1" latinLnBrk="0" hangingPunct="1">
+              <a:lnSpc>
+                <a:spcPct val="90000"/>
+              </a:lnSpc>
+              <a:spcBef>
+                <a:spcPts val="200"/>
+              </a:spcBef>
+              <a:spcAft>
+                <a:spcPts val="400"/>
+              </a:spcAft>
+              <a:buClr>
+                <a:schemeClr val="accent1"/>
+              </a:buClr>
+              <a:buFont typeface="Calibri" pitchFamily="34" charset="0"/>
+              <a:buChar char="◦"/>
+              <a:defRPr sz="1400" kern="1200">
+                <a:solidFill>
+                  <a:schemeClr val="tx1">
+                    <a:lumMod val="75000"/>
+                    <a:lumOff val="25000"/>
+                  </a:schemeClr>
+                </a:solidFill>
+                <a:latin typeface="+mn-lt"/>
+                <a:ea typeface="+mn-ea"/>
+                <a:cs typeface="+mn-cs"/>
+              </a:defRPr>
+            </a:lvl5pPr>
+            <a:lvl6pPr marL="1100000" indent="-228600" algn="l" defTabSz="914400" rtl="0" eaLnBrk="1" latinLnBrk="0" hangingPunct="1">
+              <a:lnSpc>
+                <a:spcPct val="90000"/>
+              </a:lnSpc>
+              <a:spcBef>
+                <a:spcPts val="200"/>
+              </a:spcBef>
+              <a:spcAft>
+                <a:spcPts val="400"/>
+              </a:spcAft>
+              <a:buClr>
+                <a:schemeClr val="accent1"/>
+              </a:buClr>
+              <a:buFont typeface="Calibri" pitchFamily="34" charset="0"/>
+              <a:buChar char="◦"/>
+              <a:defRPr sz="1400" kern="1200">
+                <a:solidFill>
+                  <a:schemeClr val="tx1">
+                    <a:lumMod val="75000"/>
+                    <a:lumOff val="25000"/>
+                  </a:schemeClr>
+                </a:solidFill>
+                <a:latin typeface="+mn-lt"/>
+                <a:ea typeface="+mn-ea"/>
+                <a:cs typeface="+mn-cs"/>
+              </a:defRPr>
+            </a:lvl6pPr>
+            <a:lvl7pPr marL="1300000" indent="-228600" algn="l" defTabSz="914400" rtl="0" eaLnBrk="1" latinLnBrk="0" hangingPunct="1">
+              <a:lnSpc>
+                <a:spcPct val="90000"/>
+              </a:lnSpc>
+              <a:spcBef>
+                <a:spcPts val="200"/>
+              </a:spcBef>
+              <a:spcAft>
+                <a:spcPts val="400"/>
+              </a:spcAft>
+              <a:buClr>
+                <a:schemeClr val="accent1"/>
+              </a:buClr>
+              <a:buFont typeface="Calibri" pitchFamily="34" charset="0"/>
+              <a:buChar char="◦"/>
+              <a:defRPr sz="1400" kern="1200">
+                <a:solidFill>
+                  <a:schemeClr val="tx1">
+                    <a:lumMod val="75000"/>
+                    <a:lumOff val="25000"/>
+                  </a:schemeClr>
+                </a:solidFill>
+                <a:latin typeface="+mn-lt"/>
+                <a:ea typeface="+mn-ea"/>
+                <a:cs typeface="+mn-cs"/>
+              </a:defRPr>
+            </a:lvl7pPr>
+            <a:lvl8pPr marL="1500000" indent="-228600" algn="l" defTabSz="914400" rtl="0" eaLnBrk="1" latinLnBrk="0" hangingPunct="1">
+              <a:lnSpc>
+                <a:spcPct val="90000"/>
+              </a:lnSpc>
+              <a:spcBef>
+                <a:spcPts val="200"/>
+              </a:spcBef>
+              <a:spcAft>
+                <a:spcPts val="400"/>
+              </a:spcAft>
+              <a:buClr>
+                <a:schemeClr val="accent1"/>
+              </a:buClr>
+              <a:buFont typeface="Calibri" pitchFamily="34" charset="0"/>
+              <a:buChar char="◦"/>
+              <a:defRPr sz="1400" kern="1200">
+                <a:solidFill>
+                  <a:schemeClr val="tx1">
+                    <a:lumMod val="75000"/>
+                    <a:lumOff val="25000"/>
+                  </a:schemeClr>
+                </a:solidFill>
+                <a:latin typeface="+mn-lt"/>
+                <a:ea typeface="+mn-ea"/>
+                <a:cs typeface="+mn-cs"/>
+              </a:defRPr>
+            </a:lvl8pPr>
+            <a:lvl9pPr marL="1700000" indent="-228600" algn="l" defTabSz="914400" rtl="0" eaLnBrk="1" latinLnBrk="0" hangingPunct="1">
+              <a:lnSpc>
+                <a:spcPct val="90000"/>
+              </a:lnSpc>
+              <a:spcBef>
+                <a:spcPts val="200"/>
+              </a:spcBef>
+              <a:spcAft>
+                <a:spcPts val="400"/>
+              </a:spcAft>
+              <a:buClr>
+                <a:schemeClr val="accent1"/>
+              </a:buClr>
+              <a:buFont typeface="Calibri" pitchFamily="34" charset="0"/>
+              <a:buChar char="◦"/>
+              <a:defRPr sz="1400" kern="1200">
+                <a:solidFill>
+                  <a:schemeClr val="tx1">
+                    <a:lumMod val="75000"/>
+                    <a:lumOff val="25000"/>
+                  </a:schemeClr>
+                </a:solidFill>
+                <a:latin typeface="+mn-lt"/>
+                <a:ea typeface="+mn-ea"/>
+                <a:cs typeface="+mn-cs"/>
+              </a:defRPr>
+            </a:lvl9pPr>
+          </a:lstStyle>
+          <a:p>
+            <a:pPr algn="ctr"/>
+            <a:r>
+              <a:rPr lang="tr-TR" sz="2400" b="1" u="sng" dirty="0" err="1"/>
+              <a:t>Iki</a:t>
+            </a:r>
+            <a:r>
+              <a:rPr lang="tr-TR" sz="2400" b="1" u="sng" dirty="0"/>
+              <a:t> döngü arasındaki farklar</a:t>
+            </a:r>
+          </a:p>
+          <a:p>
+            <a:pPr algn="ctr"/>
+            <a:endParaRPr lang="tr-TR" sz="2400" b="1" u="sng" dirty="0"/>
+          </a:p>
+          <a:p>
+            <a:pPr algn="l"/>
+            <a:r>
+              <a:rPr lang="tr-TR" sz="2400" dirty="0" err="1"/>
+              <a:t>For</a:t>
+            </a:r>
+            <a:r>
+              <a:rPr lang="tr-TR" sz="2400" dirty="0"/>
+              <a:t> döngüsü kullanırken koşul kısmına 3 adet </a:t>
+            </a:r>
+            <a:r>
+              <a:rPr lang="tr-TR" sz="2400" dirty="0" err="1"/>
+              <a:t>paremetre</a:t>
+            </a:r>
+            <a:r>
+              <a:rPr lang="tr-TR" sz="2400" dirty="0"/>
+              <a:t> girebiliriz, </a:t>
+            </a:r>
+            <a:r>
+              <a:rPr lang="tr-TR" sz="2400" dirty="0" err="1"/>
+              <a:t>while</a:t>
+            </a:r>
+            <a:r>
+              <a:rPr lang="tr-TR" sz="2400" dirty="0"/>
+              <a:t> dönüsü için ise 1 adet parametre girebiliriz.</a:t>
+            </a:r>
+          </a:p>
+          <a:p>
+            <a:pPr algn="l"/>
+            <a:endParaRPr lang="tr-TR" sz="2400" dirty="0"/>
+          </a:p>
+        </p:txBody>
+      </p:sp>
+      <p:pic>
+        <p:nvPicPr>
+          <p:cNvPr id="6" name="Resim 5">
+            <a:extLst>
+              <a:ext uri="{FF2B5EF4-FFF2-40B4-BE49-F238E27FC236}">
+                <a16:creationId xmlns:a16="http://schemas.microsoft.com/office/drawing/2014/main" id="{83205D69-637D-CA8C-CE50-09265BD5A828}"/>
+              </a:ext>
+            </a:extLst>
+          </p:cNvPr>
+          <p:cNvPicPr>
+            <a:picLocks noChangeAspect="1"/>
+          </p:cNvPicPr>
+          <p:nvPr/>
+        </p:nvPicPr>
+        <p:blipFill>
+          <a:blip r:embed="rId2">
+            <a:extLst>
+              <a:ext uri="{28A0092B-C50C-407E-A947-70E740481C1C}">
+                <a14:useLocalDpi xmlns:a14="http://schemas.microsoft.com/office/drawing/2010/main" val="0"/>
+              </a:ext>
+            </a:extLst>
+          </a:blip>
+          <a:stretch>
+            <a:fillRect/>
+          </a:stretch>
+        </p:blipFill>
+        <p:spPr>
+          <a:xfrm>
+            <a:off x="4991001" y="3267537"/>
+            <a:ext cx="2270957" cy="754445"/>
+          </a:xfrm>
+          <a:prstGeom prst="rect">
+            <a:avLst/>
+          </a:prstGeom>
+        </p:spPr>
+      </p:pic>
+    </p:spTree>
+    <p:extLst>
+      <p:ext uri="{BB962C8B-B14F-4D97-AF65-F5344CB8AC3E}">
+        <p14:creationId xmlns:p14="http://schemas.microsoft.com/office/powerpoint/2010/main" val="3027997767"/>
+      </p:ext>
+    </p:extLst>
+  </p:cSld>
+  <p:clrMapOvr>
+    <a:masterClrMapping/>
+  </p:clrMapOvr>
+</p:sld>
+</file>
+
 <file path=ppt/slides/slide2.xml><?xml version="1.0" encoding="utf-8"?>
 <p:sld xmlns:a="http://schemas.openxmlformats.org/drawingml/2006/main" xmlns:r="http://schemas.openxmlformats.org/officeDocument/2006/relationships" xmlns:p="http://schemas.openxmlformats.org/presentationml/2006/main">
   <p:cSld>

</xml_diff>